<commit_message>
Werte in Präsi eingetragen
</commit_message>
<xml_diff>
--- a/presentations/PJ_KI_MST3.pptx
+++ b/presentations/PJ_KI_MST3.pptx
@@ -284,7 +284,7 @@
           <a:p>
             <a:fld id="{17468778-AD1E-48E6-A1B1-00A628170ED2}" type="datetimeFigureOut">
               <a:rPr lang="de-DE" smtClean="0"/>
-              <a:t>19.06.23</a:t>
+              <a:t>19.06.2023</a:t>
             </a:fld>
             <a:endParaRPr lang="de-DE"/>
           </a:p>
@@ -482,7 +482,7 @@
           <a:p>
             <a:fld id="{17468778-AD1E-48E6-A1B1-00A628170ED2}" type="datetimeFigureOut">
               <a:rPr lang="de-DE" smtClean="0"/>
-              <a:t>19.06.23</a:t>
+              <a:t>19.06.2023</a:t>
             </a:fld>
             <a:endParaRPr lang="de-DE"/>
           </a:p>
@@ -690,7 +690,7 @@
           <a:p>
             <a:fld id="{17468778-AD1E-48E6-A1B1-00A628170ED2}" type="datetimeFigureOut">
               <a:rPr lang="de-DE" smtClean="0"/>
-              <a:t>19.06.23</a:t>
+              <a:t>19.06.2023</a:t>
             </a:fld>
             <a:endParaRPr lang="de-DE"/>
           </a:p>
@@ -888,7 +888,7 @@
           <a:p>
             <a:fld id="{17468778-AD1E-48E6-A1B1-00A628170ED2}" type="datetimeFigureOut">
               <a:rPr lang="de-DE" smtClean="0"/>
-              <a:t>19.06.23</a:t>
+              <a:t>19.06.2023</a:t>
             </a:fld>
             <a:endParaRPr lang="de-DE"/>
           </a:p>
@@ -1163,7 +1163,7 @@
           <a:p>
             <a:fld id="{17468778-AD1E-48E6-A1B1-00A628170ED2}" type="datetimeFigureOut">
               <a:rPr lang="de-DE" smtClean="0"/>
-              <a:t>19.06.23</a:t>
+              <a:t>19.06.2023</a:t>
             </a:fld>
             <a:endParaRPr lang="de-DE"/>
           </a:p>
@@ -1428,7 +1428,7 @@
           <a:p>
             <a:fld id="{17468778-AD1E-48E6-A1B1-00A628170ED2}" type="datetimeFigureOut">
               <a:rPr lang="de-DE" smtClean="0"/>
-              <a:t>19.06.23</a:t>
+              <a:t>19.06.2023</a:t>
             </a:fld>
             <a:endParaRPr lang="de-DE"/>
           </a:p>
@@ -1840,7 +1840,7 @@
           <a:p>
             <a:fld id="{17468778-AD1E-48E6-A1B1-00A628170ED2}" type="datetimeFigureOut">
               <a:rPr lang="de-DE" smtClean="0"/>
-              <a:t>19.06.23</a:t>
+              <a:t>19.06.2023</a:t>
             </a:fld>
             <a:endParaRPr lang="de-DE"/>
           </a:p>
@@ -1981,7 +1981,7 @@
           <a:p>
             <a:fld id="{17468778-AD1E-48E6-A1B1-00A628170ED2}" type="datetimeFigureOut">
               <a:rPr lang="de-DE" smtClean="0"/>
-              <a:t>19.06.23</a:t>
+              <a:t>19.06.2023</a:t>
             </a:fld>
             <a:endParaRPr lang="de-DE"/>
           </a:p>
@@ -2094,7 +2094,7 @@
           <a:p>
             <a:fld id="{17468778-AD1E-48E6-A1B1-00A628170ED2}" type="datetimeFigureOut">
               <a:rPr lang="de-DE" smtClean="0"/>
-              <a:t>19.06.23</a:t>
+              <a:t>19.06.2023</a:t>
             </a:fld>
             <a:endParaRPr lang="de-DE"/>
           </a:p>
@@ -2405,7 +2405,7 @@
           <a:p>
             <a:fld id="{17468778-AD1E-48E6-A1B1-00A628170ED2}" type="datetimeFigureOut">
               <a:rPr lang="de-DE" smtClean="0"/>
-              <a:t>19.06.23</a:t>
+              <a:t>19.06.2023</a:t>
             </a:fld>
             <a:endParaRPr lang="de-DE"/>
           </a:p>
@@ -2693,7 +2693,7 @@
           <a:p>
             <a:fld id="{17468778-AD1E-48E6-A1B1-00A628170ED2}" type="datetimeFigureOut">
               <a:rPr lang="de-DE" smtClean="0"/>
-              <a:t>19.06.23</a:t>
+              <a:t>19.06.2023</a:t>
             </a:fld>
             <a:endParaRPr lang="de-DE"/>
           </a:p>
@@ -2934,7 +2934,7 @@
           <a:p>
             <a:fld id="{17468778-AD1E-48E6-A1B1-00A628170ED2}" type="datetimeFigureOut">
               <a:rPr lang="de-DE" smtClean="0"/>
-              <a:t>19.06.23</a:t>
+              <a:t>19.06.2023</a:t>
             </a:fld>
             <a:endParaRPr lang="de-DE"/>
           </a:p>
@@ -3825,14 +3825,14 @@
           <p:nvPr>
             <p:extLst>
               <p:ext uri="{D42A27DB-BD31-4B8C-83A1-F6EECF244321}">
-                <p14:modId xmlns:p14="http://schemas.microsoft.com/office/powerpoint/2010/main" val="3356282265"/>
+                <p14:modId xmlns:p14="http://schemas.microsoft.com/office/powerpoint/2010/main" val="1604557533"/>
               </p:ext>
             </p:extLst>
           </p:nvPr>
         </p:nvGraphicFramePr>
         <p:xfrm>
           <a:off x="1466695" y="1821316"/>
-          <a:ext cx="9258609" cy="4140898"/>
+          <a:ext cx="9350830" cy="4140898"/>
         </p:xfrm>
         <a:graphic>
           <a:graphicData uri="http://schemas.openxmlformats.org/drawingml/2006/table">
@@ -3869,28 +3869,28 @@
                     </a:ext>
                   </a:extLst>
                 </a:gridCol>
-                <a:gridCol w="893163">
+                <a:gridCol w="983295">
                   <a:extLst>
                     <a:ext uri="{9D8B030D-6E8A-4147-A177-3AD203B41FA5}">
                       <a16:colId xmlns:a16="http://schemas.microsoft.com/office/drawing/2014/main" val="1720584379"/>
                     </a:ext>
                   </a:extLst>
                 </a:gridCol>
-                <a:gridCol w="907118">
+                <a:gridCol w="992038">
                   <a:extLst>
                     <a:ext uri="{9D8B030D-6E8A-4147-A177-3AD203B41FA5}">
                       <a16:colId xmlns:a16="http://schemas.microsoft.com/office/drawing/2014/main" val="3278997613"/>
                     </a:ext>
                   </a:extLst>
                 </a:gridCol>
-                <a:gridCol w="990852">
+                <a:gridCol w="1000664">
                   <a:extLst>
                     <a:ext uri="{9D8B030D-6E8A-4147-A177-3AD203B41FA5}">
                       <a16:colId xmlns:a16="http://schemas.microsoft.com/office/drawing/2014/main" val="4130188757"/>
                     </a:ext>
                   </a:extLst>
                 </a:gridCol>
-                <a:gridCol w="972538">
+                <a:gridCol w="879895">
                   <a:extLst>
                     <a:ext uri="{9D8B030D-6E8A-4147-A177-3AD203B41FA5}">
                       <a16:colId xmlns:a16="http://schemas.microsoft.com/office/drawing/2014/main" val="1425166065"/>
@@ -3973,8 +3973,17 @@
                         <a:rPr lang="de-DE" sz="1400" dirty="0">
                           <a:latin typeface="DM Sans" pitchFamily="2" charset="77"/>
                         </a:rPr>
-                        <a:t>Laufzeit in ms je nach Tiefe d mit TT</a:t>
-                      </a:r>
+                        <a:t>Laufzeit in ms je nach Tiefe d mit TT in </a:t>
+                      </a:r>
+                      <a:r>
+                        <a:rPr lang="de-DE" sz="1400" dirty="0" err="1">
+                          <a:latin typeface="DM Sans" pitchFamily="2" charset="77"/>
+                        </a:rPr>
+                        <a:t>ms</a:t>
+                      </a:r>
+                      <a:endParaRPr lang="de-DE" sz="1400" dirty="0">
+                        <a:latin typeface="DM Sans" pitchFamily="2" charset="77"/>
+                      </a:endParaRPr>
                     </a:p>
                   </a:txBody>
                   <a:tcPr marL="100481" marR="100481" marT="50240" marB="50240">
@@ -4047,8 +4056,17 @@
                         <a:rPr lang="de-DE" sz="1400" dirty="0">
                           <a:latin typeface="DM Sans" pitchFamily="2" charset="77"/>
                         </a:rPr>
-                        <a:t>. 2 „Basis KI“</a:t>
-                      </a:r>
+                        <a:t>. 2 „Basis KI“ in </a:t>
+                      </a:r>
+                      <a:r>
+                        <a:rPr lang="de-DE" sz="1400" dirty="0" err="1">
+                          <a:latin typeface="DM Sans" pitchFamily="2" charset="77"/>
+                        </a:rPr>
+                        <a:t>ms</a:t>
+                      </a:r>
+                      <a:endParaRPr lang="de-DE" sz="1400" dirty="0">
+                        <a:latin typeface="DM Sans" pitchFamily="2" charset="77"/>
+                      </a:endParaRPr>
                     </a:p>
                   </a:txBody>
                   <a:tcPr marL="100481" marR="100481" marT="50240" marB="50240">
@@ -4515,12 +4533,13 @@
                     <a:lstStyle/>
                     <a:p>
                       <a:pPr algn="ctr"/>
-                      <a:endParaRPr lang="de-DE" sz="1100">
-                        <a:latin typeface="DM Sans" pitchFamily="2" charset="77"/>
-                      </a:endParaRPr>
-                    </a:p>
-                  </a:txBody>
-                  <a:tcPr marL="100481" marR="100481" marT="50240" marB="50240" anchor="ctr">
+                      <a:r>
+                        <a:rPr lang="de-DE" sz="1200" dirty="0"/>
+                        <a:t>11,949</a:t>
+                      </a:r>
+                    </a:p>
+                  </a:txBody>
+                  <a:tcPr>
                     <a:lnR w="12700" cap="flat" cmpd="sng" algn="ctr">
                       <a:solidFill>
                         <a:schemeClr val="tx1"/>
@@ -4547,12 +4566,13 @@
                     <a:lstStyle/>
                     <a:p>
                       <a:pPr algn="ctr"/>
-                      <a:endParaRPr lang="de-DE" sz="1100">
-                        <a:latin typeface="DM Sans" pitchFamily="2" charset="77"/>
-                      </a:endParaRPr>
-                    </a:p>
-                  </a:txBody>
-                  <a:tcPr marL="100481" marR="100481" marT="50240" marB="50240" anchor="ctr">
+                      <a:r>
+                        <a:rPr lang="de-DE" sz="1200" dirty="0"/>
+                        <a:t>98,290</a:t>
+                      </a:r>
+                    </a:p>
+                  </a:txBody>
+                  <a:tcPr>
                     <a:lnL w="12700" cap="flat" cmpd="sng" algn="ctr">
                       <a:solidFill>
                         <a:schemeClr val="tx1"/>
@@ -4588,9 +4608,12 @@
                     <a:lstStyle/>
                     <a:p>
                       <a:pPr algn="ctr"/>
-                      <a:endParaRPr lang="de-DE" sz="1100">
-                        <a:latin typeface="DM Sans" pitchFamily="2" charset="77"/>
-                      </a:endParaRPr>
+                      <a:r>
+                        <a:rPr lang="de-DE" sz="1100" dirty="0">
+                          <a:latin typeface="DM Sans" pitchFamily="2" charset="77"/>
+                        </a:rPr>
+                        <a:t>-</a:t>
+                      </a:r>
                     </a:p>
                   </a:txBody>
                   <a:tcPr marL="100481" marR="100481" marT="50240" marB="50240" anchor="ctr">
@@ -4804,12 +4827,13 @@
                     <a:lstStyle/>
                     <a:p>
                       <a:pPr algn="ctr"/>
-                      <a:endParaRPr lang="de-DE" sz="1100">
-                        <a:latin typeface="DM Sans" pitchFamily="2" charset="77"/>
-                      </a:endParaRPr>
-                    </a:p>
-                  </a:txBody>
-                  <a:tcPr marL="100481" marR="100481" marT="50240" marB="50240" anchor="ctr">
+                      <a:r>
+                        <a:rPr lang="de-DE" sz="1200" dirty="0"/>
+                        <a:t>242,703</a:t>
+                      </a:r>
+                    </a:p>
+                  </a:txBody>
+                  <a:tcPr>
                     <a:lnR w="12700" cap="flat" cmpd="sng" algn="ctr">
                       <a:solidFill>
                         <a:schemeClr val="tx1"/>
@@ -4845,12 +4869,13 @@
                     <a:lstStyle/>
                     <a:p>
                       <a:pPr algn="ctr"/>
-                      <a:endParaRPr lang="de-DE" sz="1100">
-                        <a:latin typeface="DM Sans" pitchFamily="2" charset="77"/>
-                      </a:endParaRPr>
-                    </a:p>
-                  </a:txBody>
-                  <a:tcPr marL="100481" marR="100481" marT="50240" marB="50240" anchor="ctr">
+                      <a:r>
+                        <a:rPr lang="de-DE" sz="1200" dirty="0"/>
+                        <a:t>4114,663</a:t>
+                      </a:r>
+                    </a:p>
+                  </a:txBody>
+                  <a:tcPr>
                     <a:lnL w="12700" cap="flat" cmpd="sng" algn="ctr">
                       <a:solidFill>
                         <a:schemeClr val="tx1"/>
@@ -4895,9 +4920,12 @@
                     <a:lstStyle/>
                     <a:p>
                       <a:pPr algn="ctr"/>
-                      <a:endParaRPr lang="de-DE" sz="1100">
-                        <a:latin typeface="DM Sans" pitchFamily="2" charset="77"/>
-                      </a:endParaRPr>
+                      <a:r>
+                        <a:rPr lang="de-DE" sz="1100" dirty="0">
+                          <a:latin typeface="DM Sans" pitchFamily="2" charset="77"/>
+                        </a:rPr>
+                        <a:t>-</a:t>
+                      </a:r>
                     </a:p>
                   </a:txBody>
                   <a:tcPr marL="100481" marR="100481" marT="50240" marB="50240" anchor="ctr">
@@ -5084,12 +5112,13 @@
                     <a:lstStyle/>
                     <a:p>
                       <a:pPr algn="ctr"/>
-                      <a:endParaRPr lang="de-DE" sz="1100">
-                        <a:latin typeface="DM Sans" pitchFamily="2" charset="77"/>
-                      </a:endParaRPr>
-                    </a:p>
-                  </a:txBody>
-                  <a:tcPr marL="100481" marR="100481" marT="50240" marB="50240" anchor="ctr">
+                      <a:r>
+                        <a:rPr lang="de-DE" sz="1200" dirty="0"/>
+                        <a:t>37,182</a:t>
+                      </a:r>
+                    </a:p>
+                  </a:txBody>
+                  <a:tcPr>
                     <a:lnR w="12700" cap="flat" cmpd="sng" algn="ctr">
                       <a:solidFill>
                         <a:schemeClr val="tx1"/>
@@ -5116,12 +5145,13 @@
                     <a:lstStyle/>
                     <a:p>
                       <a:pPr algn="ctr"/>
-                      <a:endParaRPr lang="de-DE" sz="1100">
-                        <a:latin typeface="DM Sans" pitchFamily="2" charset="77"/>
-                      </a:endParaRPr>
-                    </a:p>
-                  </a:txBody>
-                  <a:tcPr marL="100481" marR="100481" marT="50240" marB="50240" anchor="ctr">
+                      <a:r>
+                        <a:rPr lang="de-DE" sz="1200" dirty="0"/>
+                        <a:t>380,406</a:t>
+                      </a:r>
+                    </a:p>
+                  </a:txBody>
+                  <a:tcPr>
                     <a:lnL w="12700" cap="flat" cmpd="sng" algn="ctr">
                       <a:solidFill>
                         <a:schemeClr val="tx1"/>
@@ -5157,9 +5187,12 @@
                     <a:lstStyle/>
                     <a:p>
                       <a:pPr algn="ctr"/>
-                      <a:endParaRPr lang="de-DE" sz="1100">
-                        <a:latin typeface="DM Sans" pitchFamily="2" charset="77"/>
-                      </a:endParaRPr>
+                      <a:r>
+                        <a:rPr lang="de-DE" sz="1100" dirty="0">
+                          <a:latin typeface="DM Sans" pitchFamily="2" charset="77"/>
+                        </a:rPr>
+                        <a:t>-</a:t>
+                      </a:r>
                     </a:p>
                   </a:txBody>
                   <a:tcPr marL="100481" marR="100481" marT="50240" marB="50240" anchor="ctr">
@@ -5360,12 +5393,13 @@
                     <a:lstStyle/>
                     <a:p>
                       <a:pPr algn="ctr"/>
-                      <a:endParaRPr lang="de-DE" sz="1100" dirty="0">
-                        <a:latin typeface="DM Sans" pitchFamily="2" charset="77"/>
-                      </a:endParaRPr>
-                    </a:p>
-                  </a:txBody>
-                  <a:tcPr marL="100481" marR="100481" marT="50240" marB="50240" anchor="ctr">
+                      <a:r>
+                        <a:rPr lang="de-DE" sz="1200" dirty="0"/>
+                        <a:t>14,545</a:t>
+                      </a:r>
+                    </a:p>
+                  </a:txBody>
+                  <a:tcPr>
                     <a:lnR w="12700" cap="flat" cmpd="sng" algn="ctr">
                       <a:solidFill>
                         <a:schemeClr val="tx1"/>
@@ -5392,12 +5426,13 @@
                     <a:lstStyle/>
                     <a:p>
                       <a:pPr algn="ctr"/>
-                      <a:endParaRPr lang="de-DE" sz="1100" dirty="0">
-                        <a:latin typeface="DM Sans" pitchFamily="2" charset="77"/>
-                      </a:endParaRPr>
-                    </a:p>
-                  </a:txBody>
-                  <a:tcPr marL="100481" marR="100481" marT="50240" marB="50240" anchor="ctr">
+                      <a:r>
+                        <a:rPr lang="de-DE" sz="1200" dirty="0"/>
+                        <a:t>100,660</a:t>
+                      </a:r>
+                    </a:p>
+                  </a:txBody>
+                  <a:tcPr>
                     <a:lnL w="12700" cap="flat" cmpd="sng" algn="ctr">
                       <a:solidFill>
                         <a:schemeClr val="tx1"/>
@@ -5433,9 +5468,12 @@
                     <a:lstStyle/>
                     <a:p>
                       <a:pPr algn="ctr"/>
-                      <a:endParaRPr lang="de-DE" sz="1100">
-                        <a:latin typeface="DM Sans" pitchFamily="2" charset="77"/>
-                      </a:endParaRPr>
+                      <a:r>
+                        <a:rPr lang="de-DE" sz="1100" dirty="0">
+                          <a:latin typeface="DM Sans" pitchFamily="2" charset="77"/>
+                        </a:rPr>
+                        <a:t>-</a:t>
+                      </a:r>
                     </a:p>
                   </a:txBody>
                   <a:tcPr marL="100481" marR="100481" marT="50240" marB="50240" anchor="ctr">
@@ -5649,12 +5687,13 @@
                     <a:lstStyle/>
                     <a:p>
                       <a:pPr algn="ctr"/>
-                      <a:endParaRPr lang="de-DE" sz="1100" dirty="0">
-                        <a:latin typeface="DM Sans" pitchFamily="2" charset="77"/>
-                      </a:endParaRPr>
-                    </a:p>
-                  </a:txBody>
-                  <a:tcPr marL="100481" marR="100481" marT="50240" marB="50240" anchor="ctr">
+                      <a:r>
+                        <a:rPr lang="de-DE" sz="1200" dirty="0"/>
+                        <a:t>239,449</a:t>
+                      </a:r>
+                    </a:p>
+                  </a:txBody>
+                  <a:tcPr>
                     <a:lnR w="12700" cap="flat" cmpd="sng" algn="ctr">
                       <a:solidFill>
                         <a:schemeClr val="tx1"/>
@@ -5690,12 +5729,13 @@
                     <a:lstStyle/>
                     <a:p>
                       <a:pPr algn="ctr"/>
-                      <a:endParaRPr lang="de-DE" sz="1100" dirty="0">
-                        <a:latin typeface="DM Sans" pitchFamily="2" charset="77"/>
-                      </a:endParaRPr>
-                    </a:p>
-                  </a:txBody>
-                  <a:tcPr marL="100481" marR="100481" marT="50240" marB="50240" anchor="ctr">
+                      <a:r>
+                        <a:rPr lang="de-DE" sz="1200" dirty="0"/>
+                        <a:t>4300,536</a:t>
+                      </a:r>
+                    </a:p>
+                  </a:txBody>
+                  <a:tcPr>
                     <a:lnL w="12700" cap="flat" cmpd="sng" algn="ctr">
                       <a:solidFill>
                         <a:schemeClr val="tx1"/>
@@ -5740,9 +5780,12 @@
                     <a:lstStyle/>
                     <a:p>
                       <a:pPr algn="ctr"/>
-                      <a:endParaRPr lang="de-DE" sz="1100" dirty="0">
-                        <a:latin typeface="DM Sans" pitchFamily="2" charset="77"/>
-                      </a:endParaRPr>
+                      <a:r>
+                        <a:rPr lang="de-DE" sz="1100" dirty="0">
+                          <a:latin typeface="DM Sans" pitchFamily="2" charset="77"/>
+                        </a:rPr>
+                        <a:t>-</a:t>
+                      </a:r>
                     </a:p>
                   </a:txBody>
                   <a:tcPr marL="100481" marR="100481" marT="50240" marB="50240" anchor="ctr">
@@ -5929,12 +5972,13 @@
                     <a:lstStyle/>
                     <a:p>
                       <a:pPr algn="ctr"/>
-                      <a:endParaRPr lang="de-DE" sz="1100" dirty="0">
-                        <a:latin typeface="DM Sans" pitchFamily="2" charset="77"/>
-                      </a:endParaRPr>
-                    </a:p>
-                  </a:txBody>
-                  <a:tcPr marL="100481" marR="100481" marT="50240" marB="50240" anchor="ctr">
+                      <a:r>
+                        <a:rPr lang="de-DE" sz="1200" dirty="0"/>
+                        <a:t>39,678</a:t>
+                      </a:r>
+                    </a:p>
+                  </a:txBody>
+                  <a:tcPr>
                     <a:lnR w="12700" cap="flat" cmpd="sng" algn="ctr">
                       <a:solidFill>
                         <a:schemeClr val="tx1"/>
@@ -5961,12 +6005,13 @@
                     <a:lstStyle/>
                     <a:p>
                       <a:pPr algn="ctr"/>
-                      <a:endParaRPr lang="de-DE" sz="1100" dirty="0">
-                        <a:latin typeface="DM Sans" pitchFamily="2" charset="77"/>
-                      </a:endParaRPr>
-                    </a:p>
-                  </a:txBody>
-                  <a:tcPr marL="100481" marR="100481" marT="50240" marB="50240" anchor="ctr">
+                      <a:r>
+                        <a:rPr lang="de-DE" sz="1200" dirty="0"/>
+                        <a:t>408,472</a:t>
+                      </a:r>
+                    </a:p>
+                  </a:txBody>
+                  <a:tcPr>
                     <a:lnL w="12700" cap="flat" cmpd="sng" algn="ctr">
                       <a:solidFill>
                         <a:schemeClr val="tx1"/>
@@ -6002,9 +6047,12 @@
                     <a:lstStyle/>
                     <a:p>
                       <a:pPr algn="ctr"/>
-                      <a:endParaRPr lang="de-DE" sz="1100" dirty="0">
-                        <a:latin typeface="DM Sans" pitchFamily="2" charset="77"/>
-                      </a:endParaRPr>
+                      <a:r>
+                        <a:rPr lang="de-DE" sz="1100" dirty="0">
+                          <a:latin typeface="DM Sans" pitchFamily="2" charset="77"/>
+                        </a:rPr>
+                        <a:t>-</a:t>
+                      </a:r>
                     </a:p>
                   </a:txBody>
                   <a:tcPr marL="100481" marR="100481" marT="50240" marB="50240" anchor="ctr">
@@ -6100,9 +6148,12 @@
                     <a:lstStyle/>
                     <a:p>
                       <a:pPr algn="ctr"/>
-                      <a:endParaRPr lang="de-DE" sz="1100" dirty="0">
-                        <a:latin typeface="DM Sans" pitchFamily="2" charset="77"/>
-                      </a:endParaRPr>
+                      <a:r>
+                        <a:rPr lang="de-DE" sz="1100" dirty="0">
+                          <a:latin typeface="DM Sans" pitchFamily="2" charset="77"/>
+                        </a:rPr>
+                        <a:t>1348,462</a:t>
+                      </a:r>
                     </a:p>
                   </a:txBody>
                   <a:tcPr marL="100481" marR="100481" marT="50240" marB="50240" anchor="ctr">
@@ -6132,9 +6183,12 @@
                     <a:lstStyle/>
                     <a:p>
                       <a:pPr algn="ctr"/>
-                      <a:endParaRPr lang="de-DE" sz="1100" dirty="0">
-                        <a:latin typeface="DM Sans" pitchFamily="2" charset="77"/>
-                      </a:endParaRPr>
+                      <a:r>
+                        <a:rPr lang="de-DE" sz="1100" dirty="0">
+                          <a:latin typeface="DM Sans" pitchFamily="2" charset="77"/>
+                        </a:rPr>
+                        <a:t>1335,002</a:t>
+                      </a:r>
                     </a:p>
                   </a:txBody>
                   <a:tcPr marL="100481" marR="100481" marT="50240" marB="50240" anchor="ctr">
@@ -6173,9 +6227,12 @@
                     <a:lstStyle/>
                     <a:p>
                       <a:pPr algn="ctr"/>
-                      <a:endParaRPr lang="de-DE" sz="1100" dirty="0">
-                        <a:latin typeface="DM Sans" pitchFamily="2" charset="77"/>
-                      </a:endParaRPr>
+                      <a:r>
+                        <a:rPr lang="de-DE" sz="1100" dirty="0">
+                          <a:latin typeface="DM Sans" pitchFamily="2" charset="77"/>
+                        </a:rPr>
+                        <a:t>1551,396</a:t>
+                      </a:r>
                     </a:p>
                   </a:txBody>
                   <a:tcPr marL="100481" marR="100481" marT="50240" marB="50240" anchor="ctr">
@@ -6205,12 +6262,13 @@
                     <a:lstStyle/>
                     <a:p>
                       <a:pPr algn="ctr"/>
-                      <a:endParaRPr lang="de-DE" sz="1100" dirty="0">
-                        <a:latin typeface="DM Sans" pitchFamily="2" charset="77"/>
-                      </a:endParaRPr>
-                    </a:p>
-                  </a:txBody>
-                  <a:tcPr marL="100481" marR="100481" marT="50240" marB="50240" anchor="ctr">
+                      <a:r>
+                        <a:rPr lang="de-DE" sz="1200" dirty="0"/>
+                        <a:t>19,373</a:t>
+                      </a:r>
+                    </a:p>
+                  </a:txBody>
+                  <a:tcPr>
                     <a:lnR w="12700" cap="flat" cmpd="sng" algn="ctr">
                       <a:solidFill>
                         <a:schemeClr val="tx1"/>
@@ -6237,12 +6295,13 @@
                     <a:lstStyle/>
                     <a:p>
                       <a:pPr algn="ctr"/>
-                      <a:endParaRPr lang="de-DE" sz="1100" dirty="0">
-                        <a:latin typeface="DM Sans" pitchFamily="2" charset="77"/>
-                      </a:endParaRPr>
-                    </a:p>
-                  </a:txBody>
-                  <a:tcPr marL="100481" marR="100481" marT="50240" marB="50240" anchor="ctr">
+                      <a:r>
+                        <a:rPr lang="de-DE" sz="1200" dirty="0"/>
+                        <a:t>157,096</a:t>
+                      </a:r>
+                    </a:p>
+                  </a:txBody>
+                  <a:tcPr>
                     <a:lnL w="12700" cap="flat" cmpd="sng" algn="ctr">
                       <a:solidFill>
                         <a:schemeClr val="tx1"/>
@@ -6278,9 +6337,12 @@
                     <a:lstStyle/>
                     <a:p>
                       <a:pPr algn="ctr"/>
-                      <a:endParaRPr lang="de-DE" sz="1100" dirty="0">
-                        <a:latin typeface="DM Sans" pitchFamily="2" charset="77"/>
-                      </a:endParaRPr>
+                      <a:r>
+                        <a:rPr lang="de-DE" sz="1100" dirty="0">
+                          <a:latin typeface="DM Sans" pitchFamily="2" charset="77"/>
+                        </a:rPr>
+                        <a:t>-</a:t>
+                      </a:r>
                     </a:p>
                   </a:txBody>
                   <a:tcPr marL="100481" marR="100481" marT="50240" marB="50240" anchor="ctr">
@@ -6362,9 +6424,12 @@
                     <a:lstStyle/>
                     <a:p>
                       <a:pPr algn="ctr"/>
-                      <a:endParaRPr lang="de-DE" sz="1100" dirty="0">
-                        <a:latin typeface="DM Sans" pitchFamily="2" charset="77"/>
-                      </a:endParaRPr>
+                      <a:r>
+                        <a:rPr lang="de-DE" sz="1100" dirty="0">
+                          <a:latin typeface="DM Sans" pitchFamily="2" charset="77"/>
+                        </a:rPr>
+                        <a:t>497,171</a:t>
+                      </a:r>
                     </a:p>
                   </a:txBody>
                   <a:tcPr marL="100481" marR="100481" marT="50240" marB="50240" anchor="ctr">
@@ -6403,9 +6468,12 @@
                     <a:lstStyle/>
                     <a:p>
                       <a:pPr algn="ctr"/>
-                      <a:endParaRPr lang="de-DE" sz="1100" dirty="0">
-                        <a:latin typeface="DM Sans" pitchFamily="2" charset="77"/>
-                      </a:endParaRPr>
+                      <a:r>
+                        <a:rPr lang="de-DE" sz="1100" dirty="0">
+                          <a:latin typeface="DM Sans" pitchFamily="2" charset="77"/>
+                        </a:rPr>
+                        <a:t>7865,291</a:t>
+                      </a:r>
                     </a:p>
                   </a:txBody>
                   <a:tcPr marL="100481" marR="100481" marT="50240" marB="50240" anchor="ctr">
@@ -6453,9 +6521,12 @@
                     <a:lstStyle/>
                     <a:p>
                       <a:pPr algn="ctr"/>
-                      <a:endParaRPr lang="de-DE" sz="1100" dirty="0">
-                        <a:latin typeface="DM Sans" pitchFamily="2" charset="77"/>
-                      </a:endParaRPr>
+                      <a:r>
+                        <a:rPr lang="de-DE" sz="1100" dirty="0">
+                          <a:latin typeface="DM Sans" pitchFamily="2" charset="77"/>
+                        </a:rPr>
+                        <a:t>140103,686</a:t>
+                      </a:r>
                     </a:p>
                   </a:txBody>
                   <a:tcPr marL="100481" marR="100481" marT="50240" marB="50240" anchor="ctr">
@@ -6494,12 +6565,13 @@
                     <a:lstStyle/>
                     <a:p>
                       <a:pPr algn="ctr"/>
-                      <a:endParaRPr lang="de-DE" sz="1100">
-                        <a:latin typeface="DM Sans" pitchFamily="2" charset="77"/>
-                      </a:endParaRPr>
-                    </a:p>
-                  </a:txBody>
-                  <a:tcPr marL="100481" marR="100481" marT="50240" marB="50240" anchor="ctr">
+                      <a:r>
+                        <a:rPr lang="de-DE" sz="1200" dirty="0"/>
+                        <a:t>381,390</a:t>
+                      </a:r>
+                    </a:p>
+                  </a:txBody>
+                  <a:tcPr>
                     <a:lnR w="12700" cap="flat" cmpd="sng" algn="ctr">
                       <a:solidFill>
                         <a:schemeClr val="tx1"/>
@@ -6535,12 +6607,13 @@
                     <a:lstStyle/>
                     <a:p>
                       <a:pPr algn="ctr"/>
-                      <a:endParaRPr lang="de-DE" sz="1100" dirty="0">
-                        <a:latin typeface="DM Sans" pitchFamily="2" charset="77"/>
-                      </a:endParaRPr>
-                    </a:p>
-                  </a:txBody>
-                  <a:tcPr marL="100481" marR="100481" marT="50240" marB="50240" anchor="ctr">
+                      <a:r>
+                        <a:rPr lang="de-DE" sz="1200" dirty="0"/>
+                        <a:t>7510,293</a:t>
+                      </a:r>
+                    </a:p>
+                  </a:txBody>
+                  <a:tcPr>
                     <a:lnL w="12700" cap="flat" cmpd="sng" algn="ctr">
                       <a:solidFill>
                         <a:schemeClr val="tx1"/>
@@ -6585,9 +6658,12 @@
                     <a:lstStyle/>
                     <a:p>
                       <a:pPr algn="ctr"/>
-                      <a:endParaRPr lang="de-DE" sz="1100" dirty="0">
-                        <a:latin typeface="DM Sans" pitchFamily="2" charset="77"/>
-                      </a:endParaRPr>
+                      <a:r>
+                        <a:rPr lang="de-DE" sz="1100" dirty="0">
+                          <a:latin typeface="DM Sans" pitchFamily="2" charset="77"/>
+                        </a:rPr>
+                        <a:t>-</a:t>
+                      </a:r>
                     </a:p>
                   </a:txBody>
                   <a:tcPr marL="100481" marR="100481" marT="50240" marB="50240" anchor="ctr">
@@ -6669,9 +6745,12 @@
                     <a:lstStyle/>
                     <a:p>
                       <a:pPr algn="ctr"/>
-                      <a:endParaRPr lang="de-DE" sz="1100" dirty="0">
-                        <a:latin typeface="DM Sans" pitchFamily="2" charset="77"/>
-                      </a:endParaRPr>
+                      <a:r>
+                        <a:rPr lang="de-DE" sz="1100" dirty="0">
+                          <a:latin typeface="DM Sans" pitchFamily="2" charset="77"/>
+                        </a:rPr>
+                        <a:t>145,6</a:t>
+                      </a:r>
                     </a:p>
                   </a:txBody>
                   <a:tcPr marL="100481" marR="100481" marT="50240" marB="50240" anchor="ctr">
@@ -6701,9 +6780,12 @@
                     <a:lstStyle/>
                     <a:p>
                       <a:pPr algn="ctr"/>
-                      <a:endParaRPr lang="de-DE" sz="1100" dirty="0">
-                        <a:latin typeface="DM Sans" pitchFamily="2" charset="77"/>
-                      </a:endParaRPr>
+                      <a:r>
+                        <a:rPr lang="de-DE" sz="1100" dirty="0">
+                          <a:latin typeface="DM Sans" pitchFamily="2" charset="77"/>
+                        </a:rPr>
+                        <a:t>1580,192</a:t>
+                      </a:r>
                     </a:p>
                   </a:txBody>
                   <a:tcPr marL="100481" marR="100481" marT="50240" marB="50240" anchor="ctr">
@@ -6742,9 +6824,12 @@
                     <a:lstStyle/>
                     <a:p>
                       <a:pPr algn="ctr"/>
-                      <a:endParaRPr lang="de-DE" sz="1100" dirty="0">
-                        <a:latin typeface="DM Sans" pitchFamily="2" charset="77"/>
-                      </a:endParaRPr>
+                      <a:r>
+                        <a:rPr lang="de-DE" sz="1100" dirty="0">
+                          <a:latin typeface="DM Sans" pitchFamily="2" charset="77"/>
+                        </a:rPr>
+                        <a:t>11016,856</a:t>
+                      </a:r>
                     </a:p>
                   </a:txBody>
                   <a:tcPr marL="100481" marR="100481" marT="50240" marB="50240" anchor="ctr">
@@ -6774,12 +6859,13 @@
                     <a:lstStyle/>
                     <a:p>
                       <a:pPr algn="ctr"/>
-                      <a:endParaRPr lang="de-DE" sz="1100">
-                        <a:latin typeface="DM Sans" pitchFamily="2" charset="77"/>
-                      </a:endParaRPr>
-                    </a:p>
-                  </a:txBody>
-                  <a:tcPr marL="100481" marR="100481" marT="50240" marB="50240" anchor="ctr">
+                      <a:r>
+                        <a:rPr lang="de-DE" sz="1200" dirty="0"/>
+                        <a:t>60,939</a:t>
+                      </a:r>
+                    </a:p>
+                  </a:txBody>
+                  <a:tcPr>
                     <a:lnR w="12700" cap="flat" cmpd="sng" algn="ctr">
                       <a:solidFill>
                         <a:schemeClr val="tx1"/>
@@ -6806,12 +6892,13 @@
                     <a:lstStyle/>
                     <a:p>
                       <a:pPr algn="ctr"/>
-                      <a:endParaRPr lang="de-DE" sz="1100">
-                        <a:latin typeface="DM Sans" pitchFamily="2" charset="77"/>
-                      </a:endParaRPr>
-                    </a:p>
-                  </a:txBody>
-                  <a:tcPr marL="100481" marR="100481" marT="50240" marB="50240" anchor="ctr">
+                      <a:r>
+                        <a:rPr lang="de-DE" sz="1200" dirty="0"/>
+                        <a:t>643,172</a:t>
+                      </a:r>
+                    </a:p>
+                  </a:txBody>
+                  <a:tcPr>
                     <a:lnL w="12700" cap="flat" cmpd="sng" algn="ctr">
                       <a:solidFill>
                         <a:schemeClr val="tx1"/>
@@ -6847,9 +6934,12 @@
                     <a:lstStyle/>
                     <a:p>
                       <a:pPr algn="ctr"/>
-                      <a:endParaRPr lang="de-DE" sz="1100" dirty="0">
-                        <a:latin typeface="DM Sans" pitchFamily="2" charset="77"/>
-                      </a:endParaRPr>
+                      <a:r>
+                        <a:rPr lang="de-DE" sz="1100" dirty="0">
+                          <a:latin typeface="DM Sans" pitchFamily="2" charset="77"/>
+                        </a:rPr>
+                        <a:t>-</a:t>
+                      </a:r>
                     </a:p>
                   </a:txBody>
                   <a:tcPr marL="100481" marR="100481" marT="50240" marB="50240" anchor="ctr">
@@ -10506,14 +10596,14 @@
           <p:nvPr>
             <p:extLst>
               <p:ext uri="{D42A27DB-BD31-4B8C-83A1-F6EECF244321}">
-                <p14:modId xmlns:p14="http://schemas.microsoft.com/office/powerpoint/2010/main" val="2502247306"/>
+                <p14:modId xmlns:p14="http://schemas.microsoft.com/office/powerpoint/2010/main" val="4076604144"/>
               </p:ext>
             </p:extLst>
           </p:nvPr>
         </p:nvGraphicFramePr>
         <p:xfrm>
           <a:off x="1466695" y="1821316"/>
-          <a:ext cx="9258609" cy="4140898"/>
+          <a:ext cx="9350830" cy="4312067"/>
         </p:xfrm>
         <a:graphic>
           <a:graphicData uri="http://schemas.openxmlformats.org/drawingml/2006/table">
@@ -10550,28 +10640,28 @@
                     </a:ext>
                   </a:extLst>
                 </a:gridCol>
-                <a:gridCol w="893163">
+                <a:gridCol w="1026427">
                   <a:extLst>
                     <a:ext uri="{9D8B030D-6E8A-4147-A177-3AD203B41FA5}">
                       <a16:colId xmlns:a16="http://schemas.microsoft.com/office/drawing/2014/main" val="1720584379"/>
                     </a:ext>
                   </a:extLst>
                 </a:gridCol>
-                <a:gridCol w="907118">
+                <a:gridCol w="888521">
                   <a:extLst>
                     <a:ext uri="{9D8B030D-6E8A-4147-A177-3AD203B41FA5}">
                       <a16:colId xmlns:a16="http://schemas.microsoft.com/office/drawing/2014/main" val="3278997613"/>
                     </a:ext>
                   </a:extLst>
                 </a:gridCol>
-                <a:gridCol w="990852">
+                <a:gridCol w="983411">
                   <a:extLst>
                     <a:ext uri="{9D8B030D-6E8A-4147-A177-3AD203B41FA5}">
                       <a16:colId xmlns:a16="http://schemas.microsoft.com/office/drawing/2014/main" val="4130188757"/>
                     </a:ext>
                   </a:extLst>
                 </a:gridCol>
-                <a:gridCol w="972538">
+                <a:gridCol w="957533">
                   <a:extLst>
                     <a:ext uri="{9D8B030D-6E8A-4147-A177-3AD203B41FA5}">
                       <a16:colId xmlns:a16="http://schemas.microsoft.com/office/drawing/2014/main" val="1425166065"/>
@@ -10654,8 +10744,17 @@
                         <a:rPr lang="de-DE" sz="1400" dirty="0">
                           <a:latin typeface="DM Sans" pitchFamily="2" charset="77"/>
                         </a:rPr>
-                        <a:t>Laufzeit in ms je nach Tiefe d mit TT und Zugsortierung</a:t>
-                      </a:r>
+                        <a:t>Laufzeit in ms je nach Tiefe d mit TT und Zugsortierung in </a:t>
+                      </a:r>
+                      <a:r>
+                        <a:rPr lang="de-DE" sz="1400" dirty="0" err="1">
+                          <a:latin typeface="DM Sans" pitchFamily="2" charset="77"/>
+                        </a:rPr>
+                        <a:t>ms</a:t>
+                      </a:r>
+                      <a:endParaRPr lang="de-DE" sz="1400" dirty="0">
+                        <a:latin typeface="DM Sans" pitchFamily="2" charset="77"/>
+                      </a:endParaRPr>
                     </a:p>
                   </a:txBody>
                   <a:tcPr marL="100481" marR="100481" marT="50240" marB="50240">
@@ -10728,8 +10827,17 @@
                         <a:rPr lang="de-DE" sz="1400" dirty="0">
                           <a:latin typeface="DM Sans" pitchFamily="2" charset="77"/>
                         </a:rPr>
-                        <a:t>. 2 „Basis KI“</a:t>
-                      </a:r>
+                        <a:t>. 2 „Basis KI“ in </a:t>
+                      </a:r>
+                      <a:r>
+                        <a:rPr lang="de-DE" sz="1400" dirty="0" err="1">
+                          <a:latin typeface="DM Sans" pitchFamily="2" charset="77"/>
+                        </a:rPr>
+                        <a:t>ms</a:t>
+                      </a:r>
+                      <a:endParaRPr lang="de-DE" sz="1400" dirty="0">
+                        <a:latin typeface="DM Sans" pitchFamily="2" charset="77"/>
+                      </a:endParaRPr>
                     </a:p>
                   </a:txBody>
                   <a:tcPr marL="100481" marR="100481" marT="50240" marB="50240">
@@ -11196,12 +11304,13 @@
                     <a:lstStyle/>
                     <a:p>
                       <a:pPr algn="ctr"/>
-                      <a:endParaRPr lang="de-DE" sz="1100">
-                        <a:latin typeface="DM Sans" pitchFamily="2" charset="77"/>
-                      </a:endParaRPr>
-                    </a:p>
-                  </a:txBody>
-                  <a:tcPr marL="100481" marR="100481" marT="50240" marB="50240" anchor="ctr">
+                      <a:r>
+                        <a:rPr lang="de-DE" sz="1200" dirty="0"/>
+                        <a:t>11,949</a:t>
+                      </a:r>
+                    </a:p>
+                  </a:txBody>
+                  <a:tcPr>
                     <a:lnR w="12700" cap="flat" cmpd="sng" algn="ctr">
                       <a:solidFill>
                         <a:schemeClr val="tx1"/>
@@ -11228,12 +11337,13 @@
                     <a:lstStyle/>
                     <a:p>
                       <a:pPr algn="ctr"/>
-                      <a:endParaRPr lang="de-DE" sz="1100">
-                        <a:latin typeface="DM Sans" pitchFamily="2" charset="77"/>
-                      </a:endParaRPr>
-                    </a:p>
-                  </a:txBody>
-                  <a:tcPr marL="100481" marR="100481" marT="50240" marB="50240" anchor="ctr">
+                      <a:r>
+                        <a:rPr lang="de-DE" sz="1200" dirty="0"/>
+                        <a:t>98,290</a:t>
+                      </a:r>
+                    </a:p>
+                  </a:txBody>
+                  <a:tcPr>
                     <a:lnL w="12700" cap="flat" cmpd="sng" algn="ctr">
                       <a:solidFill>
                         <a:schemeClr val="tx1"/>
@@ -11269,9 +11379,12 @@
                     <a:lstStyle/>
                     <a:p>
                       <a:pPr algn="ctr"/>
-                      <a:endParaRPr lang="de-DE" sz="1100">
-                        <a:latin typeface="DM Sans" pitchFamily="2" charset="77"/>
-                      </a:endParaRPr>
+                      <a:r>
+                        <a:rPr lang="de-DE" sz="1100" dirty="0">
+                          <a:latin typeface="DM Sans" pitchFamily="2" charset="77"/>
+                        </a:rPr>
+                        <a:t>-</a:t>
+                      </a:r>
                     </a:p>
                   </a:txBody>
                   <a:tcPr marL="100481" marR="100481" marT="50240" marB="50240" anchor="ctr">
@@ -11485,12 +11598,13 @@
                     <a:lstStyle/>
                     <a:p>
                       <a:pPr algn="ctr"/>
-                      <a:endParaRPr lang="de-DE" sz="1100">
-                        <a:latin typeface="DM Sans" pitchFamily="2" charset="77"/>
-                      </a:endParaRPr>
-                    </a:p>
-                  </a:txBody>
-                  <a:tcPr marL="100481" marR="100481" marT="50240" marB="50240" anchor="ctr">
+                      <a:r>
+                        <a:rPr lang="de-DE" sz="1200" dirty="0"/>
+                        <a:t>242,703</a:t>
+                      </a:r>
+                    </a:p>
+                  </a:txBody>
+                  <a:tcPr>
                     <a:lnR w="12700" cap="flat" cmpd="sng" algn="ctr">
                       <a:solidFill>
                         <a:schemeClr val="tx1"/>
@@ -11526,12 +11640,13 @@
                     <a:lstStyle/>
                     <a:p>
                       <a:pPr algn="ctr"/>
-                      <a:endParaRPr lang="de-DE" sz="1100">
-                        <a:latin typeface="DM Sans" pitchFamily="2" charset="77"/>
-                      </a:endParaRPr>
-                    </a:p>
-                  </a:txBody>
-                  <a:tcPr marL="100481" marR="100481" marT="50240" marB="50240" anchor="ctr">
+                      <a:r>
+                        <a:rPr lang="de-DE" sz="1200" dirty="0"/>
+                        <a:t>4114,663</a:t>
+                      </a:r>
+                    </a:p>
+                  </a:txBody>
+                  <a:tcPr>
                     <a:lnL w="12700" cap="flat" cmpd="sng" algn="ctr">
                       <a:solidFill>
                         <a:schemeClr val="tx1"/>
@@ -11576,9 +11691,12 @@
                     <a:lstStyle/>
                     <a:p>
                       <a:pPr algn="ctr"/>
-                      <a:endParaRPr lang="de-DE" sz="1100">
-                        <a:latin typeface="DM Sans" pitchFamily="2" charset="77"/>
-                      </a:endParaRPr>
+                      <a:r>
+                        <a:rPr lang="de-DE" sz="1100" dirty="0">
+                          <a:latin typeface="DM Sans" pitchFamily="2" charset="77"/>
+                        </a:rPr>
+                        <a:t>-</a:t>
+                      </a:r>
                     </a:p>
                   </a:txBody>
                   <a:tcPr marL="100481" marR="100481" marT="50240" marB="50240" anchor="ctr">
@@ -11765,12 +11883,13 @@
                     <a:lstStyle/>
                     <a:p>
                       <a:pPr algn="ctr"/>
-                      <a:endParaRPr lang="de-DE" sz="1100">
-                        <a:latin typeface="DM Sans" pitchFamily="2" charset="77"/>
-                      </a:endParaRPr>
-                    </a:p>
-                  </a:txBody>
-                  <a:tcPr marL="100481" marR="100481" marT="50240" marB="50240" anchor="ctr">
+                      <a:r>
+                        <a:rPr lang="de-DE" sz="1200" dirty="0"/>
+                        <a:t>37,182</a:t>
+                      </a:r>
+                    </a:p>
+                  </a:txBody>
+                  <a:tcPr>
                     <a:lnR w="12700" cap="flat" cmpd="sng" algn="ctr">
                       <a:solidFill>
                         <a:schemeClr val="tx1"/>
@@ -11797,12 +11916,13 @@
                     <a:lstStyle/>
                     <a:p>
                       <a:pPr algn="ctr"/>
-                      <a:endParaRPr lang="de-DE" sz="1100">
-                        <a:latin typeface="DM Sans" pitchFamily="2" charset="77"/>
-                      </a:endParaRPr>
-                    </a:p>
-                  </a:txBody>
-                  <a:tcPr marL="100481" marR="100481" marT="50240" marB="50240" anchor="ctr">
+                      <a:r>
+                        <a:rPr lang="de-DE" sz="1200" dirty="0"/>
+                        <a:t>380,406</a:t>
+                      </a:r>
+                    </a:p>
+                  </a:txBody>
+                  <a:tcPr>
                     <a:lnL w="12700" cap="flat" cmpd="sng" algn="ctr">
                       <a:solidFill>
                         <a:schemeClr val="tx1"/>
@@ -11838,9 +11958,12 @@
                     <a:lstStyle/>
                     <a:p>
                       <a:pPr algn="ctr"/>
-                      <a:endParaRPr lang="de-DE" sz="1100">
-                        <a:latin typeface="DM Sans" pitchFamily="2" charset="77"/>
-                      </a:endParaRPr>
+                      <a:r>
+                        <a:rPr lang="de-DE" sz="1100" dirty="0">
+                          <a:latin typeface="DM Sans" pitchFamily="2" charset="77"/>
+                        </a:rPr>
+                        <a:t>-</a:t>
+                      </a:r>
                     </a:p>
                   </a:txBody>
                   <a:tcPr marL="100481" marR="100481" marT="50240" marB="50240" anchor="ctr">
@@ -12041,12 +12164,13 @@
                     <a:lstStyle/>
                     <a:p>
                       <a:pPr algn="ctr"/>
-                      <a:endParaRPr lang="de-DE" sz="1100" dirty="0">
-                        <a:latin typeface="DM Sans" pitchFamily="2" charset="77"/>
-                      </a:endParaRPr>
-                    </a:p>
-                  </a:txBody>
-                  <a:tcPr marL="100481" marR="100481" marT="50240" marB="50240" anchor="ctr">
+                      <a:r>
+                        <a:rPr lang="de-DE" sz="1200" dirty="0"/>
+                        <a:t>14,545</a:t>
+                      </a:r>
+                    </a:p>
+                  </a:txBody>
+                  <a:tcPr>
                     <a:lnR w="12700" cap="flat" cmpd="sng" algn="ctr">
                       <a:solidFill>
                         <a:schemeClr val="tx1"/>
@@ -12073,12 +12197,13 @@
                     <a:lstStyle/>
                     <a:p>
                       <a:pPr algn="ctr"/>
-                      <a:endParaRPr lang="de-DE" sz="1100" dirty="0">
-                        <a:latin typeface="DM Sans" pitchFamily="2" charset="77"/>
-                      </a:endParaRPr>
-                    </a:p>
-                  </a:txBody>
-                  <a:tcPr marL="100481" marR="100481" marT="50240" marB="50240" anchor="ctr">
+                      <a:r>
+                        <a:rPr lang="de-DE" sz="1200" dirty="0"/>
+                        <a:t>100,660</a:t>
+                      </a:r>
+                    </a:p>
+                  </a:txBody>
+                  <a:tcPr>
                     <a:lnL w="12700" cap="flat" cmpd="sng" algn="ctr">
                       <a:solidFill>
                         <a:schemeClr val="tx1"/>
@@ -12114,9 +12239,12 @@
                     <a:lstStyle/>
                     <a:p>
                       <a:pPr algn="ctr"/>
-                      <a:endParaRPr lang="de-DE" sz="1100">
-                        <a:latin typeface="DM Sans" pitchFamily="2" charset="77"/>
-                      </a:endParaRPr>
+                      <a:r>
+                        <a:rPr lang="de-DE" sz="1100" dirty="0">
+                          <a:latin typeface="DM Sans" pitchFamily="2" charset="77"/>
+                        </a:rPr>
+                        <a:t>-</a:t>
+                      </a:r>
                     </a:p>
                   </a:txBody>
                   <a:tcPr marL="100481" marR="100481" marT="50240" marB="50240" anchor="ctr">
@@ -12330,12 +12458,13 @@
                     <a:lstStyle/>
                     <a:p>
                       <a:pPr algn="ctr"/>
-                      <a:endParaRPr lang="de-DE" sz="1100" dirty="0">
-                        <a:latin typeface="DM Sans" pitchFamily="2" charset="77"/>
-                      </a:endParaRPr>
-                    </a:p>
-                  </a:txBody>
-                  <a:tcPr marL="100481" marR="100481" marT="50240" marB="50240" anchor="ctr">
+                      <a:r>
+                        <a:rPr lang="de-DE" sz="1200" dirty="0"/>
+                        <a:t>239,449</a:t>
+                      </a:r>
+                    </a:p>
+                  </a:txBody>
+                  <a:tcPr>
                     <a:lnR w="12700" cap="flat" cmpd="sng" algn="ctr">
                       <a:solidFill>
                         <a:schemeClr val="tx1"/>
@@ -12371,12 +12500,13 @@
                     <a:lstStyle/>
                     <a:p>
                       <a:pPr algn="ctr"/>
-                      <a:endParaRPr lang="de-DE" sz="1100" dirty="0">
-                        <a:latin typeface="DM Sans" pitchFamily="2" charset="77"/>
-                      </a:endParaRPr>
-                    </a:p>
-                  </a:txBody>
-                  <a:tcPr marL="100481" marR="100481" marT="50240" marB="50240" anchor="ctr">
+                      <a:r>
+                        <a:rPr lang="de-DE" sz="1200" dirty="0"/>
+                        <a:t>4300,536</a:t>
+                      </a:r>
+                    </a:p>
+                  </a:txBody>
+                  <a:tcPr>
                     <a:lnL w="12700" cap="flat" cmpd="sng" algn="ctr">
                       <a:solidFill>
                         <a:schemeClr val="tx1"/>
@@ -12421,9 +12551,12 @@
                     <a:lstStyle/>
                     <a:p>
                       <a:pPr algn="ctr"/>
-                      <a:endParaRPr lang="de-DE" sz="1100" dirty="0">
-                        <a:latin typeface="DM Sans" pitchFamily="2" charset="77"/>
-                      </a:endParaRPr>
+                      <a:r>
+                        <a:rPr lang="de-DE" sz="1100" dirty="0">
+                          <a:latin typeface="DM Sans" pitchFamily="2" charset="77"/>
+                        </a:rPr>
+                        <a:t>-</a:t>
+                      </a:r>
                     </a:p>
                   </a:txBody>
                   <a:tcPr marL="100481" marR="100481" marT="50240" marB="50240" anchor="ctr">
@@ -12610,12 +12743,13 @@
                     <a:lstStyle/>
                     <a:p>
                       <a:pPr algn="ctr"/>
-                      <a:endParaRPr lang="de-DE" sz="1100" dirty="0">
-                        <a:latin typeface="DM Sans" pitchFamily="2" charset="77"/>
-                      </a:endParaRPr>
-                    </a:p>
-                  </a:txBody>
-                  <a:tcPr marL="100481" marR="100481" marT="50240" marB="50240" anchor="ctr">
+                      <a:r>
+                        <a:rPr lang="de-DE" sz="1200" dirty="0"/>
+                        <a:t>39,678</a:t>
+                      </a:r>
+                    </a:p>
+                  </a:txBody>
+                  <a:tcPr>
                     <a:lnR w="12700" cap="flat" cmpd="sng" algn="ctr">
                       <a:solidFill>
                         <a:schemeClr val="tx1"/>
@@ -12642,12 +12776,13 @@
                     <a:lstStyle/>
                     <a:p>
                       <a:pPr algn="ctr"/>
-                      <a:endParaRPr lang="de-DE" sz="1100" dirty="0">
-                        <a:latin typeface="DM Sans" pitchFamily="2" charset="77"/>
-                      </a:endParaRPr>
-                    </a:p>
-                  </a:txBody>
-                  <a:tcPr marL="100481" marR="100481" marT="50240" marB="50240" anchor="ctr">
+                      <a:r>
+                        <a:rPr lang="de-DE" sz="1200" dirty="0"/>
+                        <a:t>408,472</a:t>
+                      </a:r>
+                    </a:p>
+                  </a:txBody>
+                  <a:tcPr>
                     <a:lnL w="12700" cap="flat" cmpd="sng" algn="ctr">
                       <a:solidFill>
                         <a:schemeClr val="tx1"/>
@@ -12683,9 +12818,12 @@
                     <a:lstStyle/>
                     <a:p>
                       <a:pPr algn="ctr"/>
-                      <a:endParaRPr lang="de-DE" sz="1100" dirty="0">
-                        <a:latin typeface="DM Sans" pitchFamily="2" charset="77"/>
-                      </a:endParaRPr>
+                      <a:r>
+                        <a:rPr lang="de-DE" sz="1100" dirty="0">
+                          <a:latin typeface="DM Sans" pitchFamily="2" charset="77"/>
+                        </a:rPr>
+                        <a:t>-</a:t>
+                      </a:r>
                     </a:p>
                   </a:txBody>
                   <a:tcPr marL="100481" marR="100481" marT="50240" marB="50240" anchor="ctr">
@@ -12781,9 +12919,12 @@
                     <a:lstStyle/>
                     <a:p>
                       <a:pPr algn="ctr"/>
-                      <a:endParaRPr lang="de-DE" sz="1100" dirty="0">
-                        <a:latin typeface="DM Sans" pitchFamily="2" charset="77"/>
-                      </a:endParaRPr>
+                      <a:r>
+                        <a:rPr lang="de-DE" sz="1100" dirty="0">
+                          <a:latin typeface="DM Sans" pitchFamily="2" charset="77"/>
+                        </a:rPr>
+                        <a:t>1093,381</a:t>
+                      </a:r>
                     </a:p>
                   </a:txBody>
                   <a:tcPr marL="100481" marR="100481" marT="50240" marB="50240" anchor="ctr">
@@ -12813,9 +12954,12 @@
                     <a:lstStyle/>
                     <a:p>
                       <a:pPr algn="ctr"/>
-                      <a:endParaRPr lang="de-DE" sz="1100" dirty="0">
-                        <a:latin typeface="DM Sans" pitchFamily="2" charset="77"/>
-                      </a:endParaRPr>
+                      <a:r>
+                        <a:rPr lang="de-DE" sz="1100" dirty="0">
+                          <a:latin typeface="DM Sans" pitchFamily="2" charset="77"/>
+                        </a:rPr>
+                        <a:t>1974,368</a:t>
+                      </a:r>
                     </a:p>
                   </a:txBody>
                   <a:tcPr marL="100481" marR="100481" marT="50240" marB="50240" anchor="ctr">
@@ -12854,9 +12998,12 @@
                     <a:lstStyle/>
                     <a:p>
                       <a:pPr algn="ctr"/>
-                      <a:endParaRPr lang="de-DE" sz="1100" dirty="0">
-                        <a:latin typeface="DM Sans" pitchFamily="2" charset="77"/>
-                      </a:endParaRPr>
+                      <a:r>
+                        <a:rPr lang="de-DE" sz="1100" dirty="0">
+                          <a:latin typeface="DM Sans" pitchFamily="2" charset="77"/>
+                        </a:rPr>
+                        <a:t>1920,393</a:t>
+                      </a:r>
                     </a:p>
                   </a:txBody>
                   <a:tcPr marL="100481" marR="100481" marT="50240" marB="50240" anchor="ctr">
@@ -12886,12 +13033,13 @@
                     <a:lstStyle/>
                     <a:p>
                       <a:pPr algn="ctr"/>
-                      <a:endParaRPr lang="de-DE" sz="1100" dirty="0">
-                        <a:latin typeface="DM Sans" pitchFamily="2" charset="77"/>
-                      </a:endParaRPr>
-                    </a:p>
-                  </a:txBody>
-                  <a:tcPr marL="100481" marR="100481" marT="50240" marB="50240" anchor="ctr">
+                      <a:r>
+                        <a:rPr lang="de-DE" sz="1200" dirty="0"/>
+                        <a:t>19,373</a:t>
+                      </a:r>
+                    </a:p>
+                  </a:txBody>
+                  <a:tcPr>
                     <a:lnR w="12700" cap="flat" cmpd="sng" algn="ctr">
                       <a:solidFill>
                         <a:schemeClr val="tx1"/>
@@ -12918,12 +13066,13 @@
                     <a:lstStyle/>
                     <a:p>
                       <a:pPr algn="ctr"/>
-                      <a:endParaRPr lang="de-DE" sz="1100" dirty="0">
-                        <a:latin typeface="DM Sans" pitchFamily="2" charset="77"/>
-                      </a:endParaRPr>
-                    </a:p>
-                  </a:txBody>
-                  <a:tcPr marL="100481" marR="100481" marT="50240" marB="50240" anchor="ctr">
+                      <a:r>
+                        <a:rPr lang="de-DE" sz="1200" dirty="0"/>
+                        <a:t>157,096</a:t>
+                      </a:r>
+                    </a:p>
+                  </a:txBody>
+                  <a:tcPr>
                     <a:lnL w="12700" cap="flat" cmpd="sng" algn="ctr">
                       <a:solidFill>
                         <a:schemeClr val="tx1"/>
@@ -12959,9 +13108,12 @@
                     <a:lstStyle/>
                     <a:p>
                       <a:pPr algn="ctr"/>
-                      <a:endParaRPr lang="de-DE" sz="1100" dirty="0">
-                        <a:latin typeface="DM Sans" pitchFamily="2" charset="77"/>
-                      </a:endParaRPr>
+                      <a:r>
+                        <a:rPr lang="de-DE" sz="1100" dirty="0">
+                          <a:latin typeface="DM Sans" pitchFamily="2" charset="77"/>
+                        </a:rPr>
+                        <a:t>-</a:t>
+                      </a:r>
                     </a:p>
                   </a:txBody>
                   <a:tcPr marL="100481" marR="100481" marT="50240" marB="50240" anchor="ctr">
@@ -13043,9 +13195,12 @@
                     <a:lstStyle/>
                     <a:p>
                       <a:pPr algn="ctr"/>
-                      <a:endParaRPr lang="de-DE" sz="1100" dirty="0">
-                        <a:latin typeface="DM Sans" pitchFamily="2" charset="77"/>
-                      </a:endParaRPr>
+                      <a:r>
+                        <a:rPr lang="de-DE" sz="1100" dirty="0">
+                          <a:latin typeface="DM Sans" pitchFamily="2" charset="77"/>
+                        </a:rPr>
+                        <a:t>497,551</a:t>
+                      </a:r>
                     </a:p>
                   </a:txBody>
                   <a:tcPr marL="100481" marR="100481" marT="50240" marB="50240" anchor="ctr">
@@ -13084,9 +13239,12 @@
                     <a:lstStyle/>
                     <a:p>
                       <a:pPr algn="ctr"/>
-                      <a:endParaRPr lang="de-DE" sz="1100" dirty="0">
-                        <a:latin typeface="DM Sans" pitchFamily="2" charset="77"/>
-                      </a:endParaRPr>
+                      <a:r>
+                        <a:rPr lang="de-DE" sz="1100" dirty="0">
+                          <a:latin typeface="DM Sans" pitchFamily="2" charset="77"/>
+                        </a:rPr>
+                        <a:t>6094,413</a:t>
+                      </a:r>
                     </a:p>
                   </a:txBody>
                   <a:tcPr marL="100481" marR="100481" marT="50240" marB="50240" anchor="ctr">
@@ -13134,9 +13292,12 @@
                     <a:lstStyle/>
                     <a:p>
                       <a:pPr algn="ctr"/>
-                      <a:endParaRPr lang="de-DE" sz="1100" dirty="0">
-                        <a:latin typeface="DM Sans" pitchFamily="2" charset="77"/>
-                      </a:endParaRPr>
+                      <a:r>
+                        <a:rPr lang="de-DE" sz="1100" dirty="0">
+                          <a:latin typeface="DM Sans" pitchFamily="2" charset="77"/>
+                        </a:rPr>
+                        <a:t>92899,965</a:t>
+                      </a:r>
                     </a:p>
                   </a:txBody>
                   <a:tcPr marL="100481" marR="100481" marT="50240" marB="50240" anchor="ctr">
@@ -13175,12 +13336,13 @@
                     <a:lstStyle/>
                     <a:p>
                       <a:pPr algn="ctr"/>
-                      <a:endParaRPr lang="de-DE" sz="1100">
-                        <a:latin typeface="DM Sans" pitchFamily="2" charset="77"/>
-                      </a:endParaRPr>
-                    </a:p>
-                  </a:txBody>
-                  <a:tcPr marL="100481" marR="100481" marT="50240" marB="50240" anchor="ctr">
+                      <a:r>
+                        <a:rPr lang="de-DE" sz="1200" dirty="0"/>
+                        <a:t>381,390</a:t>
+                      </a:r>
+                    </a:p>
+                  </a:txBody>
+                  <a:tcPr>
                     <a:lnR w="12700" cap="flat" cmpd="sng" algn="ctr">
                       <a:solidFill>
                         <a:schemeClr val="tx1"/>
@@ -13216,12 +13378,13 @@
                     <a:lstStyle/>
                     <a:p>
                       <a:pPr algn="ctr"/>
-                      <a:endParaRPr lang="de-DE" sz="1100" dirty="0">
-                        <a:latin typeface="DM Sans" pitchFamily="2" charset="77"/>
-                      </a:endParaRPr>
-                    </a:p>
-                  </a:txBody>
-                  <a:tcPr marL="100481" marR="100481" marT="50240" marB="50240" anchor="ctr">
+                      <a:r>
+                        <a:rPr lang="de-DE" sz="1200" dirty="0"/>
+                        <a:t>7510,293</a:t>
+                      </a:r>
+                    </a:p>
+                  </a:txBody>
+                  <a:tcPr>
                     <a:lnL w="12700" cap="flat" cmpd="sng" algn="ctr">
                       <a:solidFill>
                         <a:schemeClr val="tx1"/>
@@ -13266,9 +13429,12 @@
                     <a:lstStyle/>
                     <a:p>
                       <a:pPr algn="ctr"/>
-                      <a:endParaRPr lang="de-DE" sz="1100" dirty="0">
-                        <a:latin typeface="DM Sans" pitchFamily="2" charset="77"/>
-                      </a:endParaRPr>
+                      <a:r>
+                        <a:rPr lang="de-DE" sz="1100" dirty="0">
+                          <a:latin typeface="DM Sans" pitchFamily="2" charset="77"/>
+                        </a:rPr>
+                        <a:t>-</a:t>
+                      </a:r>
                     </a:p>
                   </a:txBody>
                   <a:tcPr marL="100481" marR="100481" marT="50240" marB="50240" anchor="ctr">
@@ -13350,9 +13516,12 @@
                     <a:lstStyle/>
                     <a:p>
                       <a:pPr algn="ctr"/>
-                      <a:endParaRPr lang="de-DE" sz="1100" dirty="0">
-                        <a:latin typeface="DM Sans" pitchFamily="2" charset="77"/>
-                      </a:endParaRPr>
+                      <a:r>
+                        <a:rPr lang="de-DE" sz="1100" dirty="0">
+                          <a:latin typeface="DM Sans" pitchFamily="2" charset="77"/>
+                        </a:rPr>
+                        <a:t>180,868</a:t>
+                      </a:r>
                     </a:p>
                   </a:txBody>
                   <a:tcPr marL="100481" marR="100481" marT="50240" marB="50240" anchor="ctr">
@@ -13382,9 +13551,12 @@
                     <a:lstStyle/>
                     <a:p>
                       <a:pPr algn="ctr"/>
-                      <a:endParaRPr lang="de-DE" sz="1100" dirty="0">
-                        <a:latin typeface="DM Sans" pitchFamily="2" charset="77"/>
-                      </a:endParaRPr>
+                      <a:r>
+                        <a:rPr lang="de-DE" sz="1100" dirty="0">
+                          <a:latin typeface="DM Sans" pitchFamily="2" charset="77"/>
+                        </a:rPr>
+                        <a:t>1075,351</a:t>
+                      </a:r>
                     </a:p>
                   </a:txBody>
                   <a:tcPr marL="100481" marR="100481" marT="50240" marB="50240" anchor="ctr">
@@ -13423,9 +13595,12 @@
                     <a:lstStyle/>
                     <a:p>
                       <a:pPr algn="ctr"/>
-                      <a:endParaRPr lang="de-DE" sz="1100" dirty="0">
-                        <a:latin typeface="DM Sans" pitchFamily="2" charset="77"/>
-                      </a:endParaRPr>
+                      <a:r>
+                        <a:rPr lang="de-DE" sz="1100" dirty="0">
+                          <a:latin typeface="DM Sans" pitchFamily="2" charset="77"/>
+                        </a:rPr>
+                        <a:t>15496,174</a:t>
+                      </a:r>
                     </a:p>
                   </a:txBody>
                   <a:tcPr marL="100481" marR="100481" marT="50240" marB="50240" anchor="ctr">
@@ -13455,12 +13630,13 @@
                     <a:lstStyle/>
                     <a:p>
                       <a:pPr algn="ctr"/>
-                      <a:endParaRPr lang="de-DE" sz="1100">
-                        <a:latin typeface="DM Sans" pitchFamily="2" charset="77"/>
-                      </a:endParaRPr>
-                    </a:p>
-                  </a:txBody>
-                  <a:tcPr marL="100481" marR="100481" marT="50240" marB="50240" anchor="ctr">
+                      <a:r>
+                        <a:rPr lang="de-DE" sz="1200" dirty="0"/>
+                        <a:t>60,939</a:t>
+                      </a:r>
+                    </a:p>
+                  </a:txBody>
+                  <a:tcPr>
                     <a:lnR w="12700" cap="flat" cmpd="sng" algn="ctr">
                       <a:solidFill>
                         <a:schemeClr val="tx1"/>
@@ -13487,12 +13663,13 @@
                     <a:lstStyle/>
                     <a:p>
                       <a:pPr algn="ctr"/>
-                      <a:endParaRPr lang="de-DE" sz="1100">
-                        <a:latin typeface="DM Sans" pitchFamily="2" charset="77"/>
-                      </a:endParaRPr>
-                    </a:p>
-                  </a:txBody>
-                  <a:tcPr marL="100481" marR="100481" marT="50240" marB="50240" anchor="ctr">
+                      <a:r>
+                        <a:rPr lang="de-DE" sz="1200" dirty="0"/>
+                        <a:t>643,172</a:t>
+                      </a:r>
+                    </a:p>
+                  </a:txBody>
+                  <a:tcPr>
                     <a:lnL w="12700" cap="flat" cmpd="sng" algn="ctr">
                       <a:solidFill>
                         <a:schemeClr val="tx1"/>
@@ -13528,9 +13705,12 @@
                     <a:lstStyle/>
                     <a:p>
                       <a:pPr algn="ctr"/>
-                      <a:endParaRPr lang="de-DE" sz="1100" dirty="0">
-                        <a:latin typeface="DM Sans" pitchFamily="2" charset="77"/>
-                      </a:endParaRPr>
+                      <a:r>
+                        <a:rPr lang="de-DE" sz="1100" dirty="0">
+                          <a:latin typeface="DM Sans" pitchFamily="2" charset="77"/>
+                        </a:rPr>
+                        <a:t>-</a:t>
+                      </a:r>
                     </a:p>
                   </a:txBody>
                   <a:tcPr marL="100481" marR="100481" marT="50240" marB="50240" anchor="ctr">
@@ -14935,14 +15115,14 @@
           <p:nvPr>
             <p:extLst>
               <p:ext uri="{D42A27DB-BD31-4B8C-83A1-F6EECF244321}">
-                <p14:modId xmlns:p14="http://schemas.microsoft.com/office/powerpoint/2010/main" val="1511723497"/>
+                <p14:modId xmlns:p14="http://schemas.microsoft.com/office/powerpoint/2010/main" val="65508977"/>
               </p:ext>
             </p:extLst>
           </p:nvPr>
         </p:nvGraphicFramePr>
         <p:xfrm>
           <a:off x="1466695" y="1780495"/>
-          <a:ext cx="9258609" cy="4312067"/>
+          <a:ext cx="9324950" cy="4312067"/>
         </p:xfrm>
         <a:graphic>
           <a:graphicData uri="http://schemas.openxmlformats.org/drawingml/2006/table">
@@ -14979,28 +15159,28 @@
                     </a:ext>
                   </a:extLst>
                 </a:gridCol>
-                <a:gridCol w="893163">
+                <a:gridCol w="974669">
                   <a:extLst>
                     <a:ext uri="{9D8B030D-6E8A-4147-A177-3AD203B41FA5}">
                       <a16:colId xmlns:a16="http://schemas.microsoft.com/office/drawing/2014/main" val="1720584379"/>
                     </a:ext>
                   </a:extLst>
                 </a:gridCol>
-                <a:gridCol w="907118">
+                <a:gridCol w="940279">
                   <a:extLst>
                     <a:ext uri="{9D8B030D-6E8A-4147-A177-3AD203B41FA5}">
                       <a16:colId xmlns:a16="http://schemas.microsoft.com/office/drawing/2014/main" val="3278997613"/>
                     </a:ext>
                   </a:extLst>
                 </a:gridCol>
-                <a:gridCol w="990852">
+                <a:gridCol w="983411">
                   <a:extLst>
                     <a:ext uri="{9D8B030D-6E8A-4147-A177-3AD203B41FA5}">
                       <a16:colId xmlns:a16="http://schemas.microsoft.com/office/drawing/2014/main" val="4130188757"/>
                     </a:ext>
                   </a:extLst>
                 </a:gridCol>
-                <a:gridCol w="972538">
+                <a:gridCol w="931653">
                   <a:extLst>
                     <a:ext uri="{9D8B030D-6E8A-4147-A177-3AD203B41FA5}">
                       <a16:colId xmlns:a16="http://schemas.microsoft.com/office/drawing/2014/main" val="1425166065"/>
@@ -15083,8 +15263,17 @@
                         <a:rPr lang="de-DE" sz="1400" dirty="0">
                           <a:latin typeface="DM Sans" pitchFamily="2" charset="77"/>
                         </a:rPr>
-                        <a:t>Laufzeit in ms je nach Tiefe d mit TT und Zugsortierung + PVS</a:t>
-                      </a:r>
+                        <a:t>Laufzeit in ms je nach Tiefe d mit TT und Zugsortierung + PVS in </a:t>
+                      </a:r>
+                      <a:r>
+                        <a:rPr lang="de-DE" sz="1400" dirty="0" err="1">
+                          <a:latin typeface="DM Sans" pitchFamily="2" charset="77"/>
+                        </a:rPr>
+                        <a:t>ms</a:t>
+                      </a:r>
+                      <a:endParaRPr lang="de-DE" sz="1400" dirty="0">
+                        <a:latin typeface="DM Sans" pitchFamily="2" charset="77"/>
+                      </a:endParaRPr>
                     </a:p>
                   </a:txBody>
                   <a:tcPr marL="100481" marR="100481" marT="50240" marB="50240">
@@ -15157,8 +15346,17 @@
                         <a:rPr lang="de-DE" sz="1400" dirty="0">
                           <a:latin typeface="DM Sans" pitchFamily="2" charset="77"/>
                         </a:rPr>
-                        <a:t>. 2 „Basis KI“</a:t>
-                      </a:r>
+                        <a:t>. 2 „Basis KI“ in </a:t>
+                      </a:r>
+                      <a:r>
+                        <a:rPr lang="de-DE" sz="1400" dirty="0" err="1">
+                          <a:latin typeface="DM Sans" pitchFamily="2" charset="77"/>
+                        </a:rPr>
+                        <a:t>ms</a:t>
+                      </a:r>
+                      <a:endParaRPr lang="de-DE" sz="1400" dirty="0">
+                        <a:latin typeface="DM Sans" pitchFamily="2" charset="77"/>
+                      </a:endParaRPr>
                     </a:p>
                   </a:txBody>
                   <a:tcPr marL="100481" marR="100481" marT="50240" marB="50240">
@@ -15625,12 +15823,13 @@
                     <a:lstStyle/>
                     <a:p>
                       <a:pPr algn="ctr"/>
-                      <a:endParaRPr lang="de-DE" sz="1100">
-                        <a:latin typeface="DM Sans" pitchFamily="2" charset="77"/>
-                      </a:endParaRPr>
-                    </a:p>
-                  </a:txBody>
-                  <a:tcPr marL="100481" marR="100481" marT="50240" marB="50240" anchor="ctr">
+                      <a:r>
+                        <a:rPr lang="de-DE" sz="1200" dirty="0"/>
+                        <a:t>11,949</a:t>
+                      </a:r>
+                    </a:p>
+                  </a:txBody>
+                  <a:tcPr>
                     <a:lnR w="12700" cap="flat" cmpd="sng" algn="ctr">
                       <a:solidFill>
                         <a:schemeClr val="tx1"/>
@@ -15657,12 +15856,13 @@
                     <a:lstStyle/>
                     <a:p>
                       <a:pPr algn="ctr"/>
-                      <a:endParaRPr lang="de-DE" sz="1100">
-                        <a:latin typeface="DM Sans" pitchFamily="2" charset="77"/>
-                      </a:endParaRPr>
-                    </a:p>
-                  </a:txBody>
-                  <a:tcPr marL="100481" marR="100481" marT="50240" marB="50240" anchor="ctr">
+                      <a:r>
+                        <a:rPr lang="de-DE" sz="1200" dirty="0"/>
+                        <a:t>98,290</a:t>
+                      </a:r>
+                    </a:p>
+                  </a:txBody>
+                  <a:tcPr>
                     <a:lnL w="12700" cap="flat" cmpd="sng" algn="ctr">
                       <a:solidFill>
                         <a:schemeClr val="tx1"/>
@@ -15698,9 +15898,12 @@
                     <a:lstStyle/>
                     <a:p>
                       <a:pPr algn="ctr"/>
-                      <a:endParaRPr lang="de-DE" sz="1100">
-                        <a:latin typeface="DM Sans" pitchFamily="2" charset="77"/>
-                      </a:endParaRPr>
+                      <a:r>
+                        <a:rPr lang="de-DE" sz="1100" dirty="0">
+                          <a:latin typeface="DM Sans" pitchFamily="2" charset="77"/>
+                        </a:rPr>
+                        <a:t>-</a:t>
+                      </a:r>
                     </a:p>
                   </a:txBody>
                   <a:tcPr marL="100481" marR="100481" marT="50240" marB="50240" anchor="ctr">
@@ -15914,12 +16117,13 @@
                     <a:lstStyle/>
                     <a:p>
                       <a:pPr algn="ctr"/>
-                      <a:endParaRPr lang="de-DE" sz="1100">
-                        <a:latin typeface="DM Sans" pitchFamily="2" charset="77"/>
-                      </a:endParaRPr>
-                    </a:p>
-                  </a:txBody>
-                  <a:tcPr marL="100481" marR="100481" marT="50240" marB="50240" anchor="ctr">
+                      <a:r>
+                        <a:rPr lang="de-DE" sz="1200" dirty="0"/>
+                        <a:t>242,703</a:t>
+                      </a:r>
+                    </a:p>
+                  </a:txBody>
+                  <a:tcPr>
                     <a:lnR w="12700" cap="flat" cmpd="sng" algn="ctr">
                       <a:solidFill>
                         <a:schemeClr val="tx1"/>
@@ -15955,12 +16159,13 @@
                     <a:lstStyle/>
                     <a:p>
                       <a:pPr algn="ctr"/>
-                      <a:endParaRPr lang="de-DE" sz="1100">
-                        <a:latin typeface="DM Sans" pitchFamily="2" charset="77"/>
-                      </a:endParaRPr>
-                    </a:p>
-                  </a:txBody>
-                  <a:tcPr marL="100481" marR="100481" marT="50240" marB="50240" anchor="ctr">
+                      <a:r>
+                        <a:rPr lang="de-DE" sz="1200" dirty="0"/>
+                        <a:t>4114,663</a:t>
+                      </a:r>
+                    </a:p>
+                  </a:txBody>
+                  <a:tcPr>
                     <a:lnL w="12700" cap="flat" cmpd="sng" algn="ctr">
                       <a:solidFill>
                         <a:schemeClr val="tx1"/>
@@ -16005,9 +16210,12 @@
                     <a:lstStyle/>
                     <a:p>
                       <a:pPr algn="ctr"/>
-                      <a:endParaRPr lang="de-DE" sz="1100">
-                        <a:latin typeface="DM Sans" pitchFamily="2" charset="77"/>
-                      </a:endParaRPr>
+                      <a:r>
+                        <a:rPr lang="de-DE" sz="1100" dirty="0">
+                          <a:latin typeface="DM Sans" pitchFamily="2" charset="77"/>
+                        </a:rPr>
+                        <a:t>-</a:t>
+                      </a:r>
                     </a:p>
                   </a:txBody>
                   <a:tcPr marL="100481" marR="100481" marT="50240" marB="50240" anchor="ctr">
@@ -16194,12 +16402,13 @@
                     <a:lstStyle/>
                     <a:p>
                       <a:pPr algn="ctr"/>
-                      <a:endParaRPr lang="de-DE" sz="1100">
-                        <a:latin typeface="DM Sans" pitchFamily="2" charset="77"/>
-                      </a:endParaRPr>
-                    </a:p>
-                  </a:txBody>
-                  <a:tcPr marL="100481" marR="100481" marT="50240" marB="50240" anchor="ctr">
+                      <a:r>
+                        <a:rPr lang="de-DE" sz="1200" dirty="0"/>
+                        <a:t>37,182</a:t>
+                      </a:r>
+                    </a:p>
+                  </a:txBody>
+                  <a:tcPr>
                     <a:lnR w="12700" cap="flat" cmpd="sng" algn="ctr">
                       <a:solidFill>
                         <a:schemeClr val="tx1"/>
@@ -16226,12 +16435,13 @@
                     <a:lstStyle/>
                     <a:p>
                       <a:pPr algn="ctr"/>
-                      <a:endParaRPr lang="de-DE" sz="1100">
-                        <a:latin typeface="DM Sans" pitchFamily="2" charset="77"/>
-                      </a:endParaRPr>
-                    </a:p>
-                  </a:txBody>
-                  <a:tcPr marL="100481" marR="100481" marT="50240" marB="50240" anchor="ctr">
+                      <a:r>
+                        <a:rPr lang="de-DE" sz="1200" dirty="0"/>
+                        <a:t>380,406</a:t>
+                      </a:r>
+                    </a:p>
+                  </a:txBody>
+                  <a:tcPr>
                     <a:lnL w="12700" cap="flat" cmpd="sng" algn="ctr">
                       <a:solidFill>
                         <a:schemeClr val="tx1"/>
@@ -16267,9 +16477,12 @@
                     <a:lstStyle/>
                     <a:p>
                       <a:pPr algn="ctr"/>
-                      <a:endParaRPr lang="de-DE" sz="1100">
-                        <a:latin typeface="DM Sans" pitchFamily="2" charset="77"/>
-                      </a:endParaRPr>
+                      <a:r>
+                        <a:rPr lang="de-DE" sz="1100" dirty="0">
+                          <a:latin typeface="DM Sans" pitchFamily="2" charset="77"/>
+                        </a:rPr>
+                        <a:t>-</a:t>
+                      </a:r>
                     </a:p>
                   </a:txBody>
                   <a:tcPr marL="100481" marR="100481" marT="50240" marB="50240" anchor="ctr">
@@ -16470,12 +16683,13 @@
                     <a:lstStyle/>
                     <a:p>
                       <a:pPr algn="ctr"/>
-                      <a:endParaRPr lang="de-DE" sz="1100" dirty="0">
-                        <a:latin typeface="DM Sans" pitchFamily="2" charset="77"/>
-                      </a:endParaRPr>
-                    </a:p>
-                  </a:txBody>
-                  <a:tcPr marL="100481" marR="100481" marT="50240" marB="50240" anchor="ctr">
+                      <a:r>
+                        <a:rPr lang="de-DE" sz="1200" dirty="0"/>
+                        <a:t>14,545</a:t>
+                      </a:r>
+                    </a:p>
+                  </a:txBody>
+                  <a:tcPr>
                     <a:lnR w="12700" cap="flat" cmpd="sng" algn="ctr">
                       <a:solidFill>
                         <a:schemeClr val="tx1"/>
@@ -16502,12 +16716,13 @@
                     <a:lstStyle/>
                     <a:p>
                       <a:pPr algn="ctr"/>
-                      <a:endParaRPr lang="de-DE" sz="1100" dirty="0">
-                        <a:latin typeface="DM Sans" pitchFamily="2" charset="77"/>
-                      </a:endParaRPr>
-                    </a:p>
-                  </a:txBody>
-                  <a:tcPr marL="100481" marR="100481" marT="50240" marB="50240" anchor="ctr">
+                      <a:r>
+                        <a:rPr lang="de-DE" sz="1200" dirty="0"/>
+                        <a:t>100,660</a:t>
+                      </a:r>
+                    </a:p>
+                  </a:txBody>
+                  <a:tcPr>
                     <a:lnL w="12700" cap="flat" cmpd="sng" algn="ctr">
                       <a:solidFill>
                         <a:schemeClr val="tx1"/>
@@ -16543,9 +16758,12 @@
                     <a:lstStyle/>
                     <a:p>
                       <a:pPr algn="ctr"/>
-                      <a:endParaRPr lang="de-DE" sz="1100">
-                        <a:latin typeface="DM Sans" pitchFamily="2" charset="77"/>
-                      </a:endParaRPr>
+                      <a:r>
+                        <a:rPr lang="de-DE" sz="1100" dirty="0">
+                          <a:latin typeface="DM Sans" pitchFamily="2" charset="77"/>
+                        </a:rPr>
+                        <a:t>-</a:t>
+                      </a:r>
                     </a:p>
                   </a:txBody>
                   <a:tcPr marL="100481" marR="100481" marT="50240" marB="50240" anchor="ctr">
@@ -16759,12 +16977,13 @@
                     <a:lstStyle/>
                     <a:p>
                       <a:pPr algn="ctr"/>
-                      <a:endParaRPr lang="de-DE" sz="1100" dirty="0">
-                        <a:latin typeface="DM Sans" pitchFamily="2" charset="77"/>
-                      </a:endParaRPr>
-                    </a:p>
-                  </a:txBody>
-                  <a:tcPr marL="100481" marR="100481" marT="50240" marB="50240" anchor="ctr">
+                      <a:r>
+                        <a:rPr lang="de-DE" sz="1200" dirty="0"/>
+                        <a:t>239,449</a:t>
+                      </a:r>
+                    </a:p>
+                  </a:txBody>
+                  <a:tcPr>
                     <a:lnR w="12700" cap="flat" cmpd="sng" algn="ctr">
                       <a:solidFill>
                         <a:schemeClr val="tx1"/>
@@ -16800,12 +17019,13 @@
                     <a:lstStyle/>
                     <a:p>
                       <a:pPr algn="ctr"/>
-                      <a:endParaRPr lang="de-DE" sz="1100" dirty="0">
-                        <a:latin typeface="DM Sans" pitchFamily="2" charset="77"/>
-                      </a:endParaRPr>
-                    </a:p>
-                  </a:txBody>
-                  <a:tcPr marL="100481" marR="100481" marT="50240" marB="50240" anchor="ctr">
+                      <a:r>
+                        <a:rPr lang="de-DE" sz="1200" dirty="0"/>
+                        <a:t>4300,536</a:t>
+                      </a:r>
+                    </a:p>
+                  </a:txBody>
+                  <a:tcPr>
                     <a:lnL w="12700" cap="flat" cmpd="sng" algn="ctr">
                       <a:solidFill>
                         <a:schemeClr val="tx1"/>
@@ -16850,9 +17070,12 @@
                     <a:lstStyle/>
                     <a:p>
                       <a:pPr algn="ctr"/>
-                      <a:endParaRPr lang="de-DE" sz="1100" dirty="0">
-                        <a:latin typeface="DM Sans" pitchFamily="2" charset="77"/>
-                      </a:endParaRPr>
+                      <a:r>
+                        <a:rPr lang="de-DE" sz="1100" dirty="0">
+                          <a:latin typeface="DM Sans" pitchFamily="2" charset="77"/>
+                        </a:rPr>
+                        <a:t>-</a:t>
+                      </a:r>
                     </a:p>
                   </a:txBody>
                   <a:tcPr marL="100481" marR="100481" marT="50240" marB="50240" anchor="ctr">
@@ -17039,12 +17262,13 @@
                     <a:lstStyle/>
                     <a:p>
                       <a:pPr algn="ctr"/>
-                      <a:endParaRPr lang="de-DE" sz="1100" dirty="0">
-                        <a:latin typeface="DM Sans" pitchFamily="2" charset="77"/>
-                      </a:endParaRPr>
-                    </a:p>
-                  </a:txBody>
-                  <a:tcPr marL="100481" marR="100481" marT="50240" marB="50240" anchor="ctr">
+                      <a:r>
+                        <a:rPr lang="de-DE" sz="1200" dirty="0"/>
+                        <a:t>39,678</a:t>
+                      </a:r>
+                    </a:p>
+                  </a:txBody>
+                  <a:tcPr>
                     <a:lnR w="12700" cap="flat" cmpd="sng" algn="ctr">
                       <a:solidFill>
                         <a:schemeClr val="tx1"/>
@@ -17071,12 +17295,13 @@
                     <a:lstStyle/>
                     <a:p>
                       <a:pPr algn="ctr"/>
-                      <a:endParaRPr lang="de-DE" sz="1100" dirty="0">
-                        <a:latin typeface="DM Sans" pitchFamily="2" charset="77"/>
-                      </a:endParaRPr>
-                    </a:p>
-                  </a:txBody>
-                  <a:tcPr marL="100481" marR="100481" marT="50240" marB="50240" anchor="ctr">
+                      <a:r>
+                        <a:rPr lang="de-DE" sz="1200" dirty="0"/>
+                        <a:t>408,472</a:t>
+                      </a:r>
+                    </a:p>
+                  </a:txBody>
+                  <a:tcPr>
                     <a:lnL w="12700" cap="flat" cmpd="sng" algn="ctr">
                       <a:solidFill>
                         <a:schemeClr val="tx1"/>
@@ -17112,9 +17337,12 @@
                     <a:lstStyle/>
                     <a:p>
                       <a:pPr algn="ctr"/>
-                      <a:endParaRPr lang="de-DE" sz="1100" dirty="0">
-                        <a:latin typeface="DM Sans" pitchFamily="2" charset="77"/>
-                      </a:endParaRPr>
+                      <a:r>
+                        <a:rPr lang="de-DE" sz="1100" dirty="0">
+                          <a:latin typeface="DM Sans" pitchFamily="2" charset="77"/>
+                        </a:rPr>
+                        <a:t>-</a:t>
+                      </a:r>
                     </a:p>
                   </a:txBody>
                   <a:tcPr marL="100481" marR="100481" marT="50240" marB="50240" anchor="ctr">
@@ -17210,9 +17438,12 @@
                     <a:lstStyle/>
                     <a:p>
                       <a:pPr algn="ctr"/>
-                      <a:endParaRPr lang="de-DE" sz="1100" dirty="0">
-                        <a:latin typeface="DM Sans" pitchFamily="2" charset="77"/>
-                      </a:endParaRPr>
+                      <a:r>
+                        <a:rPr lang="de-DE" sz="1100" dirty="0">
+                          <a:latin typeface="DM Sans" pitchFamily="2" charset="77"/>
+                        </a:rPr>
+                        <a:t>908,159</a:t>
+                      </a:r>
                     </a:p>
                   </a:txBody>
                   <a:tcPr marL="100481" marR="100481" marT="50240" marB="50240" anchor="ctr">
@@ -17242,9 +17473,12 @@
                     <a:lstStyle/>
                     <a:p>
                       <a:pPr algn="ctr"/>
-                      <a:endParaRPr lang="de-DE" sz="1100" dirty="0">
-                        <a:latin typeface="DM Sans" pitchFamily="2" charset="77"/>
-                      </a:endParaRPr>
+                      <a:r>
+                        <a:rPr lang="de-DE" sz="1100" dirty="0">
+                          <a:latin typeface="DM Sans" pitchFamily="2" charset="77"/>
+                        </a:rPr>
+                        <a:t>1451,361</a:t>
+                      </a:r>
                     </a:p>
                   </a:txBody>
                   <a:tcPr marL="100481" marR="100481" marT="50240" marB="50240" anchor="ctr">
@@ -17283,9 +17517,12 @@
                     <a:lstStyle/>
                     <a:p>
                       <a:pPr algn="ctr"/>
-                      <a:endParaRPr lang="de-DE" sz="1100" dirty="0">
-                        <a:latin typeface="DM Sans" pitchFamily="2" charset="77"/>
-                      </a:endParaRPr>
+                      <a:r>
+                        <a:rPr lang="de-DE" sz="1100" dirty="0">
+                          <a:latin typeface="DM Sans" pitchFamily="2" charset="77"/>
+                        </a:rPr>
+                        <a:t>1358,203</a:t>
+                      </a:r>
                     </a:p>
                   </a:txBody>
                   <a:tcPr marL="100481" marR="100481" marT="50240" marB="50240" anchor="ctr">
@@ -17315,12 +17552,13 @@
                     <a:lstStyle/>
                     <a:p>
                       <a:pPr algn="ctr"/>
-                      <a:endParaRPr lang="de-DE" sz="1100" dirty="0">
-                        <a:latin typeface="DM Sans" pitchFamily="2" charset="77"/>
-                      </a:endParaRPr>
-                    </a:p>
-                  </a:txBody>
-                  <a:tcPr marL="100481" marR="100481" marT="50240" marB="50240" anchor="ctr">
+                      <a:r>
+                        <a:rPr lang="de-DE" sz="1200" dirty="0"/>
+                        <a:t>19,373</a:t>
+                      </a:r>
+                    </a:p>
+                  </a:txBody>
+                  <a:tcPr>
                     <a:lnR w="12700" cap="flat" cmpd="sng" algn="ctr">
                       <a:solidFill>
                         <a:schemeClr val="tx1"/>
@@ -17347,12 +17585,13 @@
                     <a:lstStyle/>
                     <a:p>
                       <a:pPr algn="ctr"/>
-                      <a:endParaRPr lang="de-DE" sz="1100" dirty="0">
-                        <a:latin typeface="DM Sans" pitchFamily="2" charset="77"/>
-                      </a:endParaRPr>
-                    </a:p>
-                  </a:txBody>
-                  <a:tcPr marL="100481" marR="100481" marT="50240" marB="50240" anchor="ctr">
+                      <a:r>
+                        <a:rPr lang="de-DE" sz="1200" dirty="0"/>
+                        <a:t>157,096</a:t>
+                      </a:r>
+                    </a:p>
+                  </a:txBody>
+                  <a:tcPr>
                     <a:lnL w="12700" cap="flat" cmpd="sng" algn="ctr">
                       <a:solidFill>
                         <a:schemeClr val="tx1"/>
@@ -17388,9 +17627,12 @@
                     <a:lstStyle/>
                     <a:p>
                       <a:pPr algn="ctr"/>
-                      <a:endParaRPr lang="de-DE" sz="1100" dirty="0">
-                        <a:latin typeface="DM Sans" pitchFamily="2" charset="77"/>
-                      </a:endParaRPr>
+                      <a:r>
+                        <a:rPr lang="de-DE" sz="1100" dirty="0">
+                          <a:latin typeface="DM Sans" pitchFamily="2" charset="77"/>
+                        </a:rPr>
+                        <a:t>-</a:t>
+                      </a:r>
                     </a:p>
                   </a:txBody>
                   <a:tcPr marL="100481" marR="100481" marT="50240" marB="50240" anchor="ctr">
@@ -17472,9 +17714,12 @@
                     <a:lstStyle/>
                     <a:p>
                       <a:pPr algn="ctr"/>
-                      <a:endParaRPr lang="de-DE" sz="1100" dirty="0">
-                        <a:latin typeface="DM Sans" pitchFamily="2" charset="77"/>
-                      </a:endParaRPr>
+                      <a:r>
+                        <a:rPr lang="de-DE" sz="1100" dirty="0">
+                          <a:latin typeface="DM Sans" pitchFamily="2" charset="77"/>
+                        </a:rPr>
+                        <a:t>529,691</a:t>
+                      </a:r>
                     </a:p>
                   </a:txBody>
                   <a:tcPr marL="100481" marR="100481" marT="50240" marB="50240" anchor="ctr">
@@ -17513,9 +17758,12 @@
                     <a:lstStyle/>
                     <a:p>
                       <a:pPr algn="ctr"/>
-                      <a:endParaRPr lang="de-DE" sz="1100" dirty="0">
-                        <a:latin typeface="DM Sans" pitchFamily="2" charset="77"/>
-                      </a:endParaRPr>
+                      <a:r>
+                        <a:rPr lang="de-DE" sz="1100" dirty="0">
+                          <a:latin typeface="DM Sans" pitchFamily="2" charset="77"/>
+                        </a:rPr>
+                        <a:t>3827,836</a:t>
+                      </a:r>
                     </a:p>
                   </a:txBody>
                   <a:tcPr marL="100481" marR="100481" marT="50240" marB="50240" anchor="ctr">
@@ -17563,9 +17811,12 @@
                     <a:lstStyle/>
                     <a:p>
                       <a:pPr algn="ctr"/>
-                      <a:endParaRPr lang="de-DE" sz="1100" dirty="0">
-                        <a:latin typeface="DM Sans" pitchFamily="2" charset="77"/>
-                      </a:endParaRPr>
+                      <a:r>
+                        <a:rPr lang="de-DE" sz="1100" dirty="0">
+                          <a:latin typeface="DM Sans" pitchFamily="2" charset="77"/>
+                        </a:rPr>
+                        <a:t>64457,805</a:t>
+                      </a:r>
                     </a:p>
                   </a:txBody>
                   <a:tcPr marL="100481" marR="100481" marT="50240" marB="50240" anchor="ctr">
@@ -17604,12 +17855,13 @@
                     <a:lstStyle/>
                     <a:p>
                       <a:pPr algn="ctr"/>
-                      <a:endParaRPr lang="de-DE" sz="1100">
-                        <a:latin typeface="DM Sans" pitchFamily="2" charset="77"/>
-                      </a:endParaRPr>
-                    </a:p>
-                  </a:txBody>
-                  <a:tcPr marL="100481" marR="100481" marT="50240" marB="50240" anchor="ctr">
+                      <a:r>
+                        <a:rPr lang="de-DE" sz="1200" dirty="0"/>
+                        <a:t>381,390</a:t>
+                      </a:r>
+                    </a:p>
+                  </a:txBody>
+                  <a:tcPr>
                     <a:lnR w="12700" cap="flat" cmpd="sng" algn="ctr">
                       <a:solidFill>
                         <a:schemeClr val="tx1"/>
@@ -17645,12 +17897,13 @@
                     <a:lstStyle/>
                     <a:p>
                       <a:pPr algn="ctr"/>
-                      <a:endParaRPr lang="de-DE" sz="1100" dirty="0">
-                        <a:latin typeface="DM Sans" pitchFamily="2" charset="77"/>
-                      </a:endParaRPr>
-                    </a:p>
-                  </a:txBody>
-                  <a:tcPr marL="100481" marR="100481" marT="50240" marB="50240" anchor="ctr">
+                      <a:r>
+                        <a:rPr lang="de-DE" sz="1200" dirty="0"/>
+                        <a:t>7510,293</a:t>
+                      </a:r>
+                    </a:p>
+                  </a:txBody>
+                  <a:tcPr>
                     <a:lnL w="12700" cap="flat" cmpd="sng" algn="ctr">
                       <a:solidFill>
                         <a:schemeClr val="tx1"/>
@@ -17695,9 +17948,12 @@
                     <a:lstStyle/>
                     <a:p>
                       <a:pPr algn="ctr"/>
-                      <a:endParaRPr lang="de-DE" sz="1100" dirty="0">
-                        <a:latin typeface="DM Sans" pitchFamily="2" charset="77"/>
-                      </a:endParaRPr>
+                      <a:r>
+                        <a:rPr lang="de-DE" sz="1100" dirty="0">
+                          <a:latin typeface="DM Sans" pitchFamily="2" charset="77"/>
+                        </a:rPr>
+                        <a:t>-</a:t>
+                      </a:r>
                     </a:p>
                   </a:txBody>
                   <a:tcPr marL="100481" marR="100481" marT="50240" marB="50240" anchor="ctr">
@@ -17779,9 +18035,12 @@
                     <a:lstStyle/>
                     <a:p>
                       <a:pPr algn="ctr"/>
-                      <a:endParaRPr lang="de-DE" sz="1100" dirty="0">
-                        <a:latin typeface="DM Sans" pitchFamily="2" charset="77"/>
-                      </a:endParaRPr>
+                      <a:r>
+                        <a:rPr lang="de-DE" sz="1100" dirty="0">
+                          <a:latin typeface="DM Sans" pitchFamily="2" charset="77"/>
+                        </a:rPr>
+                        <a:t>180,526</a:t>
+                      </a:r>
                     </a:p>
                   </a:txBody>
                   <a:tcPr marL="100481" marR="100481" marT="50240" marB="50240" anchor="ctr">
@@ -17811,9 +18070,12 @@
                     <a:lstStyle/>
                     <a:p>
                       <a:pPr algn="ctr"/>
-                      <a:endParaRPr lang="de-DE" sz="1100" dirty="0">
-                        <a:latin typeface="DM Sans" pitchFamily="2" charset="77"/>
-                      </a:endParaRPr>
+                      <a:r>
+                        <a:rPr lang="de-DE" sz="1100" dirty="0">
+                          <a:latin typeface="DM Sans" pitchFamily="2" charset="77"/>
+                        </a:rPr>
+                        <a:t>795,511</a:t>
+                      </a:r>
                     </a:p>
                   </a:txBody>
                   <a:tcPr marL="100481" marR="100481" marT="50240" marB="50240" anchor="ctr">
@@ -17852,9 +18114,12 @@
                     <a:lstStyle/>
                     <a:p>
                       <a:pPr algn="ctr"/>
-                      <a:endParaRPr lang="de-DE" sz="1100" dirty="0">
-                        <a:latin typeface="DM Sans" pitchFamily="2" charset="77"/>
-                      </a:endParaRPr>
+                      <a:r>
+                        <a:rPr lang="de-DE" sz="1100" dirty="0">
+                          <a:latin typeface="DM Sans" pitchFamily="2" charset="77"/>
+                        </a:rPr>
+                        <a:t>8724,172</a:t>
+                      </a:r>
                     </a:p>
                   </a:txBody>
                   <a:tcPr marL="100481" marR="100481" marT="50240" marB="50240" anchor="ctr">
@@ -17884,12 +18149,13 @@
                     <a:lstStyle/>
                     <a:p>
                       <a:pPr algn="ctr"/>
-                      <a:endParaRPr lang="de-DE" sz="1100">
-                        <a:latin typeface="DM Sans" pitchFamily="2" charset="77"/>
-                      </a:endParaRPr>
-                    </a:p>
-                  </a:txBody>
-                  <a:tcPr marL="100481" marR="100481" marT="50240" marB="50240" anchor="ctr">
+                      <a:r>
+                        <a:rPr lang="de-DE" sz="1200" dirty="0"/>
+                        <a:t>60,939</a:t>
+                      </a:r>
+                    </a:p>
+                  </a:txBody>
+                  <a:tcPr>
                     <a:lnR w="12700" cap="flat" cmpd="sng" algn="ctr">
                       <a:solidFill>
                         <a:schemeClr val="tx1"/>
@@ -17916,12 +18182,13 @@
                     <a:lstStyle/>
                     <a:p>
                       <a:pPr algn="ctr"/>
-                      <a:endParaRPr lang="de-DE" sz="1100">
-                        <a:latin typeface="DM Sans" pitchFamily="2" charset="77"/>
-                      </a:endParaRPr>
-                    </a:p>
-                  </a:txBody>
-                  <a:tcPr marL="100481" marR="100481" marT="50240" marB="50240" anchor="ctr">
+                      <a:r>
+                        <a:rPr lang="de-DE" sz="1200" dirty="0"/>
+                        <a:t>643,172</a:t>
+                      </a:r>
+                    </a:p>
+                  </a:txBody>
+                  <a:tcPr>
                     <a:lnL w="12700" cap="flat" cmpd="sng" algn="ctr">
                       <a:solidFill>
                         <a:schemeClr val="tx1"/>
@@ -17957,9 +18224,12 @@
                     <a:lstStyle/>
                     <a:p>
                       <a:pPr algn="ctr"/>
-                      <a:endParaRPr lang="de-DE" sz="1100" dirty="0">
-                        <a:latin typeface="DM Sans" pitchFamily="2" charset="77"/>
-                      </a:endParaRPr>
+                      <a:r>
+                        <a:rPr lang="de-DE" sz="1100" dirty="0">
+                          <a:latin typeface="DM Sans" pitchFamily="2" charset="77"/>
+                        </a:rPr>
+                        <a:t>-</a:t>
+                      </a:r>
                     </a:p>
                   </a:txBody>
                   <a:tcPr marL="100481" marR="100481" marT="50240" marB="50240" anchor="ctr">
@@ -21201,12 +21471,145 @@
           </a:bodyPr>
           <a:lstStyle/>
           <a:p>
-            <a:pPr marL="0" indent="0">
+            <a:pPr>
               <a:lnSpc>
                 <a:spcPct val="150000"/>
               </a:lnSpc>
-              <a:buNone/>
+              <a:buFontTx/>
+              <a:buChar char="-"/>
             </a:pPr>
+            <a:r>
+              <a:rPr lang="de-DE" sz="2000" dirty="0">
+                <a:latin typeface="DM Sans" pitchFamily="2" charset="77"/>
+              </a:rPr>
+              <a:t>Neuerungen</a:t>
+            </a:r>
+            <a:r>
+              <a:rPr lang="de-DE" sz="1600" dirty="0">
+                <a:latin typeface="DM Sans" pitchFamily="2" charset="77"/>
+              </a:rPr>
+              <a:t>:</a:t>
+            </a:r>
+          </a:p>
+          <a:p>
+            <a:pPr lvl="1">
+              <a:lnSpc>
+                <a:spcPct val="150000"/>
+              </a:lnSpc>
+              <a:buFontTx/>
+              <a:buChar char="-"/>
+            </a:pPr>
+            <a:r>
+              <a:rPr lang="de-DE" sz="1600" dirty="0">
+                <a:latin typeface="DM Sans" pitchFamily="2" charset="77"/>
+              </a:rPr>
+              <a:t>Monte-Carlo-</a:t>
+            </a:r>
+            <a:r>
+              <a:rPr lang="de-DE" sz="1600" dirty="0" err="1">
+                <a:latin typeface="DM Sans" pitchFamily="2" charset="77"/>
+              </a:rPr>
+              <a:t>Tree</a:t>
+            </a:r>
+            <a:r>
+              <a:rPr lang="de-DE" sz="1600" dirty="0">
+                <a:latin typeface="DM Sans" pitchFamily="2" charset="77"/>
+              </a:rPr>
+              <a:t>-Search als Eröffnungsbibliothek</a:t>
+            </a:r>
+          </a:p>
+          <a:p>
+            <a:pPr lvl="1">
+              <a:lnSpc>
+                <a:spcPct val="150000"/>
+              </a:lnSpc>
+              <a:buFontTx/>
+              <a:buChar char="-"/>
+            </a:pPr>
+            <a:r>
+              <a:rPr lang="de-DE" sz="1600" dirty="0">
+                <a:latin typeface="DM Sans" pitchFamily="2" charset="77"/>
+              </a:rPr>
+              <a:t>Minimal </a:t>
+            </a:r>
+            <a:r>
+              <a:rPr lang="de-DE" sz="1600" dirty="0" err="1">
+                <a:latin typeface="DM Sans" pitchFamily="2" charset="77"/>
+              </a:rPr>
+              <a:t>Window</a:t>
+            </a:r>
+            <a:r>
+              <a:rPr lang="de-DE" sz="1600" dirty="0">
+                <a:latin typeface="DM Sans" pitchFamily="2" charset="77"/>
+              </a:rPr>
+              <a:t> Search</a:t>
+            </a:r>
+          </a:p>
+          <a:p>
+            <a:pPr>
+              <a:lnSpc>
+                <a:spcPct val="150000"/>
+              </a:lnSpc>
+              <a:buFontTx/>
+              <a:buChar char="-"/>
+            </a:pPr>
+            <a:r>
+              <a:rPr lang="de-DE" sz="2000" dirty="0">
+                <a:latin typeface="DM Sans" pitchFamily="2" charset="77"/>
+              </a:rPr>
+              <a:t>Verbesserungen:</a:t>
+            </a:r>
+          </a:p>
+          <a:p>
+            <a:pPr lvl="1">
+              <a:lnSpc>
+                <a:spcPct val="150000"/>
+              </a:lnSpc>
+              <a:buFontTx/>
+              <a:buChar char="-"/>
+            </a:pPr>
+            <a:r>
+              <a:rPr lang="de-DE" sz="1600" dirty="0">
+                <a:latin typeface="DM Sans" pitchFamily="2" charset="77"/>
+              </a:rPr>
+              <a:t>Alpha-Beta Suche verbessern mit Null-Move-</a:t>
+            </a:r>
+            <a:r>
+              <a:rPr lang="de-DE" sz="1600" dirty="0" err="1">
+                <a:latin typeface="DM Sans" pitchFamily="2" charset="77"/>
+              </a:rPr>
+              <a:t>Pruning</a:t>
+            </a:r>
+            <a:endParaRPr lang="de-DE" sz="1600" dirty="0">
+              <a:latin typeface="DM Sans" pitchFamily="2" charset="77"/>
+            </a:endParaRPr>
+          </a:p>
+          <a:p>
+            <a:pPr lvl="1">
+              <a:lnSpc>
+                <a:spcPct val="150000"/>
+              </a:lnSpc>
+              <a:buFontTx/>
+              <a:buChar char="-"/>
+            </a:pPr>
+            <a:r>
+              <a:rPr lang="de-DE" sz="1600" dirty="0">
+                <a:latin typeface="DM Sans" pitchFamily="2" charset="77"/>
+              </a:rPr>
+              <a:t>Evolutionäre Bestimmung der </a:t>
+            </a:r>
+            <a:r>
+              <a:rPr lang="de-DE" sz="1600" dirty="0" err="1">
+                <a:latin typeface="DM Sans" pitchFamily="2" charset="77"/>
+              </a:rPr>
+              <a:t>Bewertungfunktions</a:t>
+            </a:r>
+            <a:r>
+              <a:rPr lang="de-DE" sz="1600">
+                <a:latin typeface="DM Sans" pitchFamily="2" charset="77"/>
+              </a:rPr>
+              <a:t>-Parametern</a:t>
+            </a:r>
             <a:endParaRPr lang="de-DE" sz="1600" dirty="0">
               <a:latin typeface="DM Sans" pitchFamily="2" charset="77"/>
             </a:endParaRPr>

</xml_diff>

<commit_message>
nochmal, diesmal mit speicherm
</commit_message>
<xml_diff>
--- a/presentations/PJ_KI_MST3.pptx
+++ b/presentations/PJ_KI_MST3.pptx
@@ -3825,7 +3825,7 @@
           <p:nvPr>
             <p:extLst>
               <p:ext uri="{D42A27DB-BD31-4B8C-83A1-F6EECF244321}">
-                <p14:modId xmlns:p14="http://schemas.microsoft.com/office/powerpoint/2010/main" val="1604557533"/>
+                <p14:modId xmlns:p14="http://schemas.microsoft.com/office/powerpoint/2010/main" val="2988541204"/>
               </p:ext>
             </p:extLst>
           </p:nvPr>
@@ -3973,17 +3973,8 @@
                         <a:rPr lang="de-DE" sz="1400" dirty="0">
                           <a:latin typeface="DM Sans" pitchFamily="2" charset="77"/>
                         </a:rPr>
-                        <a:t>Laufzeit in ms je nach Tiefe d mit TT in </a:t>
-                      </a:r>
-                      <a:r>
-                        <a:rPr lang="de-DE" sz="1400" dirty="0" err="1">
-                          <a:latin typeface="DM Sans" pitchFamily="2" charset="77"/>
-                        </a:rPr>
-                        <a:t>ms</a:t>
-                      </a:r>
-                      <a:endParaRPr lang="de-DE" sz="1400" dirty="0">
-                        <a:latin typeface="DM Sans" pitchFamily="2" charset="77"/>
-                      </a:endParaRPr>
+                        <a:t>Laufzeit in ms je nach Tiefe d mit TT</a:t>
+                      </a:r>
                     </a:p>
                   </a:txBody>
                   <a:tcPr marL="100481" marR="100481" marT="50240" marB="50240">
@@ -4056,17 +4047,8 @@
                         <a:rPr lang="de-DE" sz="1400" dirty="0">
                           <a:latin typeface="DM Sans" pitchFamily="2" charset="77"/>
                         </a:rPr>
-                        <a:t>. 2 „Basis KI“ in </a:t>
-                      </a:r>
-                      <a:r>
-                        <a:rPr lang="de-DE" sz="1400" dirty="0" err="1">
-                          <a:latin typeface="DM Sans" pitchFamily="2" charset="77"/>
-                        </a:rPr>
-                        <a:t>ms</a:t>
-                      </a:r>
-                      <a:endParaRPr lang="de-DE" sz="1400" dirty="0">
-                        <a:latin typeface="DM Sans" pitchFamily="2" charset="77"/>
-                      </a:endParaRPr>
+                        <a:t>. 2 „Basis KI“</a:t>
+                      </a:r>
                     </a:p>
                   </a:txBody>
                   <a:tcPr marL="100481" marR="100481" marT="50240" marB="50240">
@@ -10596,14 +10578,14 @@
           <p:nvPr>
             <p:extLst>
               <p:ext uri="{D42A27DB-BD31-4B8C-83A1-F6EECF244321}">
-                <p14:modId xmlns:p14="http://schemas.microsoft.com/office/powerpoint/2010/main" val="4076604144"/>
+                <p14:modId xmlns:p14="http://schemas.microsoft.com/office/powerpoint/2010/main" val="303310212"/>
               </p:ext>
             </p:extLst>
           </p:nvPr>
         </p:nvGraphicFramePr>
         <p:xfrm>
           <a:off x="1466695" y="1821316"/>
-          <a:ext cx="9350830" cy="4312067"/>
+          <a:ext cx="9350830" cy="4140898"/>
         </p:xfrm>
         <a:graphic>
           <a:graphicData uri="http://schemas.openxmlformats.org/drawingml/2006/table">
@@ -10744,17 +10726,8 @@
                         <a:rPr lang="de-DE" sz="1400" dirty="0">
                           <a:latin typeface="DM Sans" pitchFamily="2" charset="77"/>
                         </a:rPr>
-                        <a:t>Laufzeit in ms je nach Tiefe d mit TT und Zugsortierung in </a:t>
-                      </a:r>
-                      <a:r>
-                        <a:rPr lang="de-DE" sz="1400" dirty="0" err="1">
-                          <a:latin typeface="DM Sans" pitchFamily="2" charset="77"/>
-                        </a:rPr>
-                        <a:t>ms</a:t>
-                      </a:r>
-                      <a:endParaRPr lang="de-DE" sz="1400" dirty="0">
-                        <a:latin typeface="DM Sans" pitchFamily="2" charset="77"/>
-                      </a:endParaRPr>
+                        <a:t>Laufzeit in ms je nach Tiefe d mit TT und Zugsortierung</a:t>
+                      </a:r>
                     </a:p>
                   </a:txBody>
                   <a:tcPr marL="100481" marR="100481" marT="50240" marB="50240">
@@ -10827,17 +10800,8 @@
                         <a:rPr lang="de-DE" sz="1400" dirty="0">
                           <a:latin typeface="DM Sans" pitchFamily="2" charset="77"/>
                         </a:rPr>
-                        <a:t>. 2 „Basis KI“ in </a:t>
-                      </a:r>
-                      <a:r>
-                        <a:rPr lang="de-DE" sz="1400" dirty="0" err="1">
-                          <a:latin typeface="DM Sans" pitchFamily="2" charset="77"/>
-                        </a:rPr>
-                        <a:t>ms</a:t>
-                      </a:r>
-                      <a:endParaRPr lang="de-DE" sz="1400" dirty="0">
-                        <a:latin typeface="DM Sans" pitchFamily="2" charset="77"/>
-                      </a:endParaRPr>
+                        <a:t>. 2 „Basis KI“</a:t>
+                      </a:r>
                     </a:p>
                   </a:txBody>
                   <a:tcPr marL="100481" marR="100481" marT="50240" marB="50240">
@@ -15115,7 +15079,7 @@
           <p:nvPr>
             <p:extLst>
               <p:ext uri="{D42A27DB-BD31-4B8C-83A1-F6EECF244321}">
-                <p14:modId xmlns:p14="http://schemas.microsoft.com/office/powerpoint/2010/main" val="65508977"/>
+                <p14:modId xmlns:p14="http://schemas.microsoft.com/office/powerpoint/2010/main" val="2937551974"/>
               </p:ext>
             </p:extLst>
           </p:nvPr>
@@ -15263,17 +15227,8 @@
                         <a:rPr lang="de-DE" sz="1400" dirty="0">
                           <a:latin typeface="DM Sans" pitchFamily="2" charset="77"/>
                         </a:rPr>
-                        <a:t>Laufzeit in ms je nach Tiefe d mit TT und Zugsortierung + PVS in </a:t>
-                      </a:r>
-                      <a:r>
-                        <a:rPr lang="de-DE" sz="1400" dirty="0" err="1">
-                          <a:latin typeface="DM Sans" pitchFamily="2" charset="77"/>
-                        </a:rPr>
-                        <a:t>ms</a:t>
-                      </a:r>
-                      <a:endParaRPr lang="de-DE" sz="1400" dirty="0">
-                        <a:latin typeface="DM Sans" pitchFamily="2" charset="77"/>
-                      </a:endParaRPr>
+                        <a:t>Laufzeit in ms je nach Tiefe d mit TT und Zugsortierung + PVS</a:t>
+                      </a:r>
                     </a:p>
                   </a:txBody>
                   <a:tcPr marL="100481" marR="100481" marT="50240" marB="50240">
@@ -15346,17 +15301,8 @@
                         <a:rPr lang="de-DE" sz="1400" dirty="0">
                           <a:latin typeface="DM Sans" pitchFamily="2" charset="77"/>
                         </a:rPr>
-                        <a:t>. 2 „Basis KI“ in </a:t>
-                      </a:r>
-                      <a:r>
-                        <a:rPr lang="de-DE" sz="1400" dirty="0" err="1">
-                          <a:latin typeface="DM Sans" pitchFamily="2" charset="77"/>
-                        </a:rPr>
-                        <a:t>ms</a:t>
-                      </a:r>
-                      <a:endParaRPr lang="de-DE" sz="1400" dirty="0">
-                        <a:latin typeface="DM Sans" pitchFamily="2" charset="77"/>
-                      </a:endParaRPr>
+                        <a:t>. 2 „Basis KI“</a:t>
+                      </a:r>
                     </a:p>
                   </a:txBody>
                   <a:tcPr marL="100481" marR="100481" marT="50240" marB="50240">
@@ -21605,14 +21551,11 @@
               <a:t>Bewertungfunktions</a:t>
             </a:r>
             <a:r>
-              <a:rPr lang="de-DE" sz="1600">
+              <a:rPr lang="de-DE" sz="1600" dirty="0">
                 <a:latin typeface="DM Sans" pitchFamily="2" charset="77"/>
               </a:rPr>
               <a:t>-Parametern</a:t>
             </a:r>
-            <a:endParaRPr lang="de-DE" sz="1600" dirty="0">
-              <a:latin typeface="DM Sans" pitchFamily="2" charset="77"/>
-            </a:endParaRPr>
           </a:p>
         </p:txBody>
       </p:sp>

</xml_diff>